<commit_message>
MaJ rappel du besoin
</commit_message>
<xml_diff>
--- a/docs/Présentation CES'eat.pptx
+++ b/docs/Présentation CES'eat.pptx
@@ -9,37 +9,38 @@
     <p:sldId id="257" r:id="rId3"/>
     <p:sldId id="258" r:id="rId4"/>
     <p:sldId id="259" r:id="rId5"/>
-    <p:sldId id="275" r:id="rId6"/>
-    <p:sldId id="274" r:id="rId7"/>
-    <p:sldId id="260" r:id="rId8"/>
-    <p:sldId id="261" r:id="rId9"/>
-    <p:sldId id="262" r:id="rId10"/>
-    <p:sldId id="263" r:id="rId11"/>
-    <p:sldId id="264" r:id="rId12"/>
-    <p:sldId id="265" r:id="rId13"/>
-    <p:sldId id="266" r:id="rId14"/>
-    <p:sldId id="267" r:id="rId15"/>
-    <p:sldId id="268" r:id="rId16"/>
-    <p:sldId id="269" r:id="rId17"/>
-    <p:sldId id="270" r:id="rId18"/>
-    <p:sldId id="271" r:id="rId19"/>
-    <p:sldId id="272" r:id="rId20"/>
-    <p:sldId id="273" r:id="rId21"/>
+    <p:sldId id="276" r:id="rId6"/>
+    <p:sldId id="275" r:id="rId7"/>
+    <p:sldId id="274" r:id="rId8"/>
+    <p:sldId id="260" r:id="rId9"/>
+    <p:sldId id="261" r:id="rId10"/>
+    <p:sldId id="262" r:id="rId11"/>
+    <p:sldId id="263" r:id="rId12"/>
+    <p:sldId id="264" r:id="rId13"/>
+    <p:sldId id="265" r:id="rId14"/>
+    <p:sldId id="266" r:id="rId15"/>
+    <p:sldId id="267" r:id="rId16"/>
+    <p:sldId id="268" r:id="rId17"/>
+    <p:sldId id="269" r:id="rId18"/>
+    <p:sldId id="270" r:id="rId19"/>
+    <p:sldId id="271" r:id="rId20"/>
+    <p:sldId id="272" r:id="rId21"/>
+    <p:sldId id="273" r:id="rId22"/>
   </p:sldIdLst>
   <p:sldSz cx="18288000" cy="10287000"/>
   <p:notesSz cx="6858000" cy="9144000"/>
   <p:embeddedFontLst>
     <p:embeddedFont>
       <p:font typeface="Alegreya" panose="020B0604020202020204" charset="0"/>
-      <p:regular r:id="rId22"/>
+      <p:regular r:id="rId23"/>
     </p:embeddedFont>
     <p:embeddedFont>
       <p:font typeface="Alegreya Bold" panose="020B0604020202020204" charset="0"/>
-      <p:regular r:id="rId23"/>
+      <p:regular r:id="rId24"/>
     </p:embeddedFont>
     <p:embeddedFont>
       <p:font typeface="Bobby Jones" panose="020B0604020202020204" charset="0"/>
-      <p:regular r:id="rId24"/>
+      <p:regular r:id="rId25"/>
     </p:embeddedFont>
   </p:embeddedFontLst>
   <p:defaultTextStyle>
@@ -3275,6 +3276,527 @@
 </file>
 
 <file path=ppt/slides/slide10.xml><?xml version="1.0" encoding="utf-8"?>
+<p:sld xmlns:a="http://schemas.openxmlformats.org/drawingml/2006/main" xmlns:r="http://schemas.openxmlformats.org/officeDocument/2006/relationships" xmlns:p="http://schemas.openxmlformats.org/presentationml/2006/main">
+  <p:cSld>
+    <p:spTree>
+      <p:nvGrpSpPr>
+        <p:cNvPr id="1" name=""/>
+        <p:cNvGrpSpPr/>
+        <p:nvPr/>
+      </p:nvGrpSpPr>
+      <p:grpSpPr>
+        <a:xfrm>
+          <a:off x="0" y="0"/>
+          <a:ext cx="0" cy="0"/>
+          <a:chOff x="0" y="0"/>
+          <a:chExt cx="0" cy="0"/>
+        </a:xfrm>
+      </p:grpSpPr>
+      <p:sp>
+        <p:nvSpPr>
+          <p:cNvPr id="2" name="Freeform 2"/>
+          <p:cNvSpPr/>
+          <p:nvPr/>
+        </p:nvSpPr>
+        <p:spPr>
+          <a:xfrm>
+            <a:off x="0" y="0"/>
+            <a:ext cx="18288000" cy="10287000"/>
+          </a:xfrm>
+          <a:custGeom>
+            <a:avLst/>
+            <a:gdLst/>
+            <a:ahLst/>
+            <a:cxnLst/>
+            <a:rect l="l" t="t" r="r" b="b"/>
+            <a:pathLst>
+              <a:path w="18288000" h="10287000">
+                <a:moveTo>
+                  <a:pt x="0" y="0"/>
+                </a:moveTo>
+                <a:lnTo>
+                  <a:pt x="18288000" y="0"/>
+                </a:lnTo>
+                <a:lnTo>
+                  <a:pt x="18288000" y="10287000"/>
+                </a:lnTo>
+                <a:lnTo>
+                  <a:pt x="0" y="10287000"/>
+                </a:lnTo>
+                <a:lnTo>
+                  <a:pt x="0" y="0"/>
+                </a:lnTo>
+                <a:close/>
+              </a:path>
+            </a:pathLst>
+          </a:custGeom>
+          <a:blipFill>
+            <a:blip r:embed="rId2"/>
+            <a:stretch>
+              <a:fillRect l="-220" t="-9510" r="-1696" b="-11203"/>
+            </a:stretch>
+          </a:blipFill>
+        </p:spPr>
+        <p:txBody>
+          <a:bodyPr/>
+          <a:lstStyle/>
+          <a:p>
+            <a:endParaRPr lang="fr-FR"/>
+          </a:p>
+        </p:txBody>
+      </p:sp>
+      <p:grpSp>
+        <p:nvGrpSpPr>
+          <p:cNvPr id="3" name="Group 3"/>
+          <p:cNvGrpSpPr>
+            <a:grpSpLocks noChangeAspect="1"/>
+          </p:cNvGrpSpPr>
+          <p:nvPr/>
+        </p:nvGrpSpPr>
+        <p:grpSpPr>
+          <a:xfrm>
+            <a:off x="1334007" y="3124680"/>
+            <a:ext cx="4690072" cy="4690054"/>
+            <a:chOff x="0" y="0"/>
+            <a:chExt cx="6350000" cy="6349975"/>
+          </a:xfrm>
+        </p:grpSpPr>
+        <p:sp>
+          <p:nvSpPr>
+            <p:cNvPr id="4" name="Freeform 4"/>
+            <p:cNvSpPr/>
+            <p:nvPr/>
+          </p:nvSpPr>
+          <p:spPr>
+            <a:xfrm>
+              <a:off x="0" y="0"/>
+              <a:ext cx="6350000" cy="6349974"/>
+            </a:xfrm>
+            <a:custGeom>
+              <a:avLst/>
+              <a:gdLst/>
+              <a:ahLst/>
+              <a:cxnLst/>
+              <a:rect l="l" t="t" r="r" b="b"/>
+              <a:pathLst>
+                <a:path w="6350000" h="6349974">
+                  <a:moveTo>
+                    <a:pt x="6350000" y="3175025"/>
+                  </a:moveTo>
+                  <a:cubicBezTo>
+                    <a:pt x="6350000" y="4928451"/>
+                    <a:pt x="4928476" y="6349974"/>
+                    <a:pt x="3175000" y="6349974"/>
+                  </a:cubicBezTo>
+                  <a:cubicBezTo>
+                    <a:pt x="1421498" y="6349974"/>
+                    <a:pt x="0" y="4928451"/>
+                    <a:pt x="0" y="3175025"/>
+                  </a:cubicBezTo>
+                  <a:cubicBezTo>
+                    <a:pt x="0" y="1421511"/>
+                    <a:pt x="1421498" y="0"/>
+                    <a:pt x="3175000" y="0"/>
+                  </a:cubicBezTo>
+                  <a:cubicBezTo>
+                    <a:pt x="4928501" y="0"/>
+                    <a:pt x="6350000" y="1421511"/>
+                    <a:pt x="6350000" y="3175025"/>
+                  </a:cubicBezTo>
+                  <a:close/>
+                </a:path>
+              </a:pathLst>
+            </a:custGeom>
+            <a:blipFill>
+              <a:blip r:embed="rId3"/>
+              <a:stretch>
+                <a:fillRect l="-13054" t="-34515" r="-639" b="-35813"/>
+              </a:stretch>
+            </a:blipFill>
+          </p:spPr>
+          <p:txBody>
+            <a:bodyPr/>
+            <a:lstStyle/>
+            <a:p>
+              <a:endParaRPr lang="fr-FR"/>
+            </a:p>
+          </p:txBody>
+        </p:sp>
+      </p:grpSp>
+      <p:grpSp>
+        <p:nvGrpSpPr>
+          <p:cNvPr id="5" name="Group 5"/>
+          <p:cNvGrpSpPr>
+            <a:grpSpLocks noChangeAspect="1"/>
+          </p:cNvGrpSpPr>
+          <p:nvPr/>
+        </p:nvGrpSpPr>
+        <p:grpSpPr>
+          <a:xfrm>
+            <a:off x="6818416" y="3124680"/>
+            <a:ext cx="4690072" cy="4690054"/>
+            <a:chOff x="0" y="0"/>
+            <a:chExt cx="6350000" cy="6349975"/>
+          </a:xfrm>
+        </p:grpSpPr>
+        <p:sp>
+          <p:nvSpPr>
+            <p:cNvPr id="6" name="Freeform 6"/>
+            <p:cNvSpPr/>
+            <p:nvPr/>
+          </p:nvSpPr>
+          <p:spPr>
+            <a:xfrm>
+              <a:off x="0" y="0"/>
+              <a:ext cx="6350000" cy="6349974"/>
+            </a:xfrm>
+            <a:custGeom>
+              <a:avLst/>
+              <a:gdLst/>
+              <a:ahLst/>
+              <a:cxnLst/>
+              <a:rect l="l" t="t" r="r" b="b"/>
+              <a:pathLst>
+                <a:path w="6350000" h="6349974">
+                  <a:moveTo>
+                    <a:pt x="6350000" y="3175025"/>
+                  </a:moveTo>
+                  <a:cubicBezTo>
+                    <a:pt x="6350000" y="4928451"/>
+                    <a:pt x="4928476" y="6349974"/>
+                    <a:pt x="3175000" y="6349974"/>
+                  </a:cubicBezTo>
+                  <a:cubicBezTo>
+                    <a:pt x="1421498" y="6349974"/>
+                    <a:pt x="0" y="4928451"/>
+                    <a:pt x="0" y="3175025"/>
+                  </a:cubicBezTo>
+                  <a:cubicBezTo>
+                    <a:pt x="0" y="1421511"/>
+                    <a:pt x="1421498" y="0"/>
+                    <a:pt x="3175000" y="0"/>
+                  </a:cubicBezTo>
+                  <a:cubicBezTo>
+                    <a:pt x="4928501" y="0"/>
+                    <a:pt x="6350000" y="1421511"/>
+                    <a:pt x="6350000" y="3175025"/>
+                  </a:cubicBezTo>
+                  <a:close/>
+                </a:path>
+              </a:pathLst>
+            </a:custGeom>
+            <a:blipFill>
+              <a:blip r:embed="rId4"/>
+              <a:stretch>
+                <a:fillRect t="-44768" b="-5326"/>
+              </a:stretch>
+            </a:blipFill>
+          </p:spPr>
+          <p:txBody>
+            <a:bodyPr/>
+            <a:lstStyle/>
+            <a:p>
+              <a:endParaRPr lang="fr-FR"/>
+            </a:p>
+          </p:txBody>
+        </p:sp>
+      </p:grpSp>
+      <p:grpSp>
+        <p:nvGrpSpPr>
+          <p:cNvPr id="7" name="Group 7"/>
+          <p:cNvGrpSpPr>
+            <a:grpSpLocks noChangeAspect="1"/>
+          </p:cNvGrpSpPr>
+          <p:nvPr/>
+        </p:nvGrpSpPr>
+        <p:grpSpPr>
+          <a:xfrm>
+            <a:off x="12302825" y="3124680"/>
+            <a:ext cx="4690072" cy="4690054"/>
+            <a:chOff x="0" y="0"/>
+            <a:chExt cx="6350000" cy="6349975"/>
+          </a:xfrm>
+        </p:grpSpPr>
+        <p:sp>
+          <p:nvSpPr>
+            <p:cNvPr id="8" name="Freeform 8"/>
+            <p:cNvSpPr/>
+            <p:nvPr/>
+          </p:nvSpPr>
+          <p:spPr>
+            <a:xfrm>
+              <a:off x="0" y="0"/>
+              <a:ext cx="6350000" cy="6349974"/>
+            </a:xfrm>
+            <a:custGeom>
+              <a:avLst/>
+              <a:gdLst/>
+              <a:ahLst/>
+              <a:cxnLst/>
+              <a:rect l="l" t="t" r="r" b="b"/>
+              <a:pathLst>
+                <a:path w="6350000" h="6349974">
+                  <a:moveTo>
+                    <a:pt x="6350000" y="3175025"/>
+                  </a:moveTo>
+                  <a:cubicBezTo>
+                    <a:pt x="6350000" y="4928451"/>
+                    <a:pt x="4928476" y="6349974"/>
+                    <a:pt x="3175000" y="6349974"/>
+                  </a:cubicBezTo>
+                  <a:cubicBezTo>
+                    <a:pt x="1421498" y="6349974"/>
+                    <a:pt x="0" y="4928451"/>
+                    <a:pt x="0" y="3175025"/>
+                  </a:cubicBezTo>
+                  <a:cubicBezTo>
+                    <a:pt x="0" y="1421511"/>
+                    <a:pt x="1421498" y="0"/>
+                    <a:pt x="3175000" y="0"/>
+                  </a:cubicBezTo>
+                  <a:cubicBezTo>
+                    <a:pt x="4928501" y="0"/>
+                    <a:pt x="6350000" y="1421511"/>
+                    <a:pt x="6350000" y="3175025"/>
+                  </a:cubicBezTo>
+                  <a:close/>
+                </a:path>
+              </a:pathLst>
+            </a:custGeom>
+            <a:blipFill>
+              <a:blip r:embed="rId5"/>
+              <a:stretch>
+                <a:fillRect l="-25471" r="-25471"/>
+              </a:stretch>
+            </a:blipFill>
+          </p:spPr>
+          <p:txBody>
+            <a:bodyPr/>
+            <a:lstStyle/>
+            <a:p>
+              <a:endParaRPr lang="fr-FR"/>
+            </a:p>
+          </p:txBody>
+        </p:sp>
+      </p:grpSp>
+      <p:sp>
+        <p:nvSpPr>
+          <p:cNvPr id="9" name="TextBox 9"/>
+          <p:cNvSpPr txBox="1"/>
+          <p:nvPr/>
+        </p:nvSpPr>
+        <p:spPr>
+          <a:xfrm>
+            <a:off x="1372912" y="8033809"/>
+            <a:ext cx="4651168" cy="712470"/>
+          </a:xfrm>
+          <a:prstGeom prst="rect">
+            <a:avLst/>
+          </a:prstGeom>
+        </p:spPr>
+        <p:txBody>
+          <a:bodyPr lIns="0" tIns="0" rIns="0" bIns="0" rtlCol="0" anchor="t">
+            <a:spAutoFit/>
+          </a:bodyPr>
+          <a:lstStyle/>
+          <a:p>
+            <a:pPr algn="ctr">
+              <a:lnSpc>
+                <a:spcPts val="5880"/>
+              </a:lnSpc>
+            </a:pPr>
+            <a:r>
+              <a:rPr lang="en-US" sz="4200" b="1">
+                <a:solidFill>
+                  <a:srgbClr val="000000"/>
+                </a:solidFill>
+                <a:latin typeface="Alegreya Bold"/>
+                <a:ea typeface="Alegreya Bold"/>
+                <a:cs typeface="Alegreya Bold"/>
+                <a:sym typeface="Alegreya Bold"/>
+              </a:rPr>
+              <a:t>Juliana Silva</a:t>
+            </a:r>
+          </a:p>
+        </p:txBody>
+      </p:sp>
+      <p:sp>
+        <p:nvSpPr>
+          <p:cNvPr id="10" name="TextBox 10"/>
+          <p:cNvSpPr txBox="1"/>
+          <p:nvPr/>
+        </p:nvSpPr>
+        <p:spPr>
+          <a:xfrm>
+            <a:off x="6857321" y="8033809"/>
+            <a:ext cx="4651168" cy="712470"/>
+          </a:xfrm>
+          <a:prstGeom prst="rect">
+            <a:avLst/>
+          </a:prstGeom>
+        </p:spPr>
+        <p:txBody>
+          <a:bodyPr lIns="0" tIns="0" rIns="0" bIns="0" rtlCol="0" anchor="t">
+            <a:spAutoFit/>
+          </a:bodyPr>
+          <a:lstStyle/>
+          <a:p>
+            <a:pPr algn="ctr">
+              <a:lnSpc>
+                <a:spcPts val="5880"/>
+              </a:lnSpc>
+            </a:pPr>
+            <a:r>
+              <a:rPr lang="en-US" sz="4200" b="1">
+                <a:solidFill>
+                  <a:srgbClr val="000000"/>
+                </a:solidFill>
+                <a:latin typeface="Alegreya Bold"/>
+                <a:ea typeface="Alegreya Bold"/>
+                <a:cs typeface="Alegreya Bold"/>
+                <a:sym typeface="Alegreya Bold"/>
+              </a:rPr>
+              <a:t>Olivia Wilson</a:t>
+            </a:r>
+          </a:p>
+        </p:txBody>
+      </p:sp>
+      <p:sp>
+        <p:nvSpPr>
+          <p:cNvPr id="11" name="TextBox 11"/>
+          <p:cNvSpPr txBox="1"/>
+          <p:nvPr/>
+        </p:nvSpPr>
+        <p:spPr>
+          <a:xfrm>
+            <a:off x="12341730" y="8033809"/>
+            <a:ext cx="4651168" cy="712470"/>
+          </a:xfrm>
+          <a:prstGeom prst="rect">
+            <a:avLst/>
+          </a:prstGeom>
+        </p:spPr>
+        <p:txBody>
+          <a:bodyPr lIns="0" tIns="0" rIns="0" bIns="0" rtlCol="0" anchor="t">
+            <a:spAutoFit/>
+          </a:bodyPr>
+          <a:lstStyle/>
+          <a:p>
+            <a:pPr algn="ctr">
+              <a:lnSpc>
+                <a:spcPts val="5880"/>
+              </a:lnSpc>
+            </a:pPr>
+            <a:r>
+              <a:rPr lang="en-US" sz="4200" b="1">
+                <a:solidFill>
+                  <a:srgbClr val="000000"/>
+                </a:solidFill>
+                <a:latin typeface="Alegreya Bold"/>
+                <a:ea typeface="Alegreya Bold"/>
+                <a:cs typeface="Alegreya Bold"/>
+                <a:sym typeface="Alegreya Bold"/>
+              </a:rPr>
+              <a:t>Claudia Alves</a:t>
+            </a:r>
+          </a:p>
+        </p:txBody>
+      </p:sp>
+      <p:sp>
+        <p:nvSpPr>
+          <p:cNvPr id="12" name="TextBox 12"/>
+          <p:cNvSpPr txBox="1"/>
+          <p:nvPr/>
+        </p:nvSpPr>
+        <p:spPr>
+          <a:xfrm>
+            <a:off x="3679044" y="847725"/>
+            <a:ext cx="10929913" cy="1332031"/>
+          </a:xfrm>
+          <a:prstGeom prst="rect">
+            <a:avLst/>
+          </a:prstGeom>
+        </p:spPr>
+        <p:txBody>
+          <a:bodyPr lIns="0" tIns="0" rIns="0" bIns="0" rtlCol="0" anchor="t">
+            <a:spAutoFit/>
+          </a:bodyPr>
+          <a:lstStyle/>
+          <a:p>
+            <a:pPr algn="ctr">
+              <a:lnSpc>
+                <a:spcPts val="11432"/>
+              </a:lnSpc>
+            </a:pPr>
+            <a:r>
+              <a:rPr lang="en-US" sz="8165" dirty="0">
+                <a:solidFill>
+                  <a:srgbClr val="000000"/>
+                </a:solidFill>
+                <a:latin typeface="Bobby Jones"/>
+                <a:ea typeface="Bobby Jones"/>
+                <a:cs typeface="Bobby Jones"/>
+                <a:sym typeface="Bobby Jones"/>
+              </a:rPr>
+              <a:t>﻿</a:t>
+            </a:r>
+            <a:r>
+              <a:rPr lang="en-US" sz="8165" dirty="0" err="1">
+                <a:solidFill>
+                  <a:srgbClr val="000000"/>
+                </a:solidFill>
+                <a:latin typeface="Bobby Jones"/>
+                <a:ea typeface="Bobby Jones"/>
+                <a:cs typeface="Bobby Jones"/>
+                <a:sym typeface="Bobby Jones"/>
+              </a:rPr>
+              <a:t>Présentation</a:t>
+            </a:r>
+            <a:r>
+              <a:rPr lang="en-US" sz="8165" dirty="0">
+                <a:solidFill>
+                  <a:srgbClr val="000000"/>
+                </a:solidFill>
+                <a:latin typeface="Bobby Jones"/>
+                <a:ea typeface="Bobby Jones"/>
+                <a:cs typeface="Bobby Jones"/>
+                <a:sym typeface="Bobby Jones"/>
+              </a:rPr>
+              <a:t> du </a:t>
+            </a:r>
+            <a:r>
+              <a:rPr lang="en-US" sz="8165" dirty="0" err="1">
+                <a:solidFill>
+                  <a:srgbClr val="000000"/>
+                </a:solidFill>
+                <a:latin typeface="Bobby Jones"/>
+                <a:ea typeface="Bobby Jones"/>
+                <a:cs typeface="Bobby Jones"/>
+                <a:sym typeface="Bobby Jones"/>
+              </a:rPr>
+              <a:t>groupe</a:t>
+            </a:r>
+            <a:endParaRPr lang="en-US" sz="8165" dirty="0">
+              <a:solidFill>
+                <a:srgbClr val="000000"/>
+              </a:solidFill>
+              <a:latin typeface="Bobby Jones"/>
+              <a:ea typeface="Bobby Jones"/>
+              <a:cs typeface="Bobby Jones"/>
+              <a:sym typeface="Bobby Jones"/>
+            </a:endParaRPr>
+          </a:p>
+        </p:txBody>
+      </p:sp>
+    </p:spTree>
+  </p:cSld>
+  <p:clrMapOvr>
+    <a:masterClrMapping/>
+  </p:clrMapOvr>
+</p:sld>
+</file>
+
+<file path=ppt/slides/slide11.xml><?xml version="1.0" encoding="utf-8"?>
 <p:sld xmlns:a="http://schemas.openxmlformats.org/drawingml/2006/main" xmlns:r="http://schemas.openxmlformats.org/officeDocument/2006/relationships" xmlns:p="http://schemas.openxmlformats.org/presentationml/2006/main">
   <p:cSld>
     <p:spTree>
@@ -4682,7 +5204,7 @@
 </p:sld>
 </file>
 
-<file path=ppt/slides/slide11.xml><?xml version="1.0" encoding="utf-8"?>
+<file path=ppt/slides/slide12.xml><?xml version="1.0" encoding="utf-8"?>
 <p:sld xmlns:a="http://schemas.openxmlformats.org/drawingml/2006/main" xmlns:r="http://schemas.openxmlformats.org/officeDocument/2006/relationships" xmlns:p="http://schemas.openxmlformats.org/presentationml/2006/main">
   <p:cSld>
     <p:spTree>
@@ -5250,7 +5772,7 @@
 </p:sld>
 </file>
 
-<file path=ppt/slides/slide12.xml><?xml version="1.0" encoding="utf-8"?>
+<file path=ppt/slides/slide13.xml><?xml version="1.0" encoding="utf-8"?>
 <p:sld xmlns:a="http://schemas.openxmlformats.org/drawingml/2006/main" xmlns:r="http://schemas.openxmlformats.org/officeDocument/2006/relationships" xmlns:p="http://schemas.openxmlformats.org/presentationml/2006/main">
   <p:cSld>
     <p:spTree>
@@ -6059,7 +6581,7 @@
 </p:sld>
 </file>
 
-<file path=ppt/slides/slide13.xml><?xml version="1.0" encoding="utf-8"?>
+<file path=ppt/slides/slide14.xml><?xml version="1.0" encoding="utf-8"?>
 <p:sld xmlns:a="http://schemas.openxmlformats.org/drawingml/2006/main" xmlns:r="http://schemas.openxmlformats.org/officeDocument/2006/relationships" xmlns:p="http://schemas.openxmlformats.org/presentationml/2006/main">
   <p:cSld>
     <p:spTree>
@@ -6814,7 +7336,7 @@
 </p:sld>
 </file>
 
-<file path=ppt/slides/slide14.xml><?xml version="1.0" encoding="utf-8"?>
+<file path=ppt/slides/slide15.xml><?xml version="1.0" encoding="utf-8"?>
 <p:sld xmlns:a="http://schemas.openxmlformats.org/drawingml/2006/main" xmlns:r="http://schemas.openxmlformats.org/officeDocument/2006/relationships" xmlns:p="http://schemas.openxmlformats.org/presentationml/2006/main">
   <p:cSld>
     <p:spTree>
@@ -7220,7 +7742,7 @@
 </p:sld>
 </file>
 
-<file path=ppt/slides/slide15.xml><?xml version="1.0" encoding="utf-8"?>
+<file path=ppt/slides/slide16.xml><?xml version="1.0" encoding="utf-8"?>
 <p:sld xmlns:a="http://schemas.openxmlformats.org/drawingml/2006/main" xmlns:r="http://schemas.openxmlformats.org/officeDocument/2006/relationships" xmlns:p="http://schemas.openxmlformats.org/presentationml/2006/main">
   <p:cSld>
     <p:spTree>
@@ -7698,7 +8220,7 @@
 </p:sld>
 </file>
 
-<file path=ppt/slides/slide16.xml><?xml version="1.0" encoding="utf-8"?>
+<file path=ppt/slides/slide17.xml><?xml version="1.0" encoding="utf-8"?>
 <p:sld xmlns:a="http://schemas.openxmlformats.org/drawingml/2006/main" xmlns:r="http://schemas.openxmlformats.org/officeDocument/2006/relationships" xmlns:p="http://schemas.openxmlformats.org/presentationml/2006/main">
   <p:cSld>
     <p:spTree>
@@ -8176,7 +8698,7 @@
 </p:sld>
 </file>
 
-<file path=ppt/slides/slide17.xml><?xml version="1.0" encoding="utf-8"?>
+<file path=ppt/slides/slide18.xml><?xml version="1.0" encoding="utf-8"?>
 <p:sld xmlns:a="http://schemas.openxmlformats.org/drawingml/2006/main" xmlns:r="http://schemas.openxmlformats.org/officeDocument/2006/relationships" xmlns:p="http://schemas.openxmlformats.org/presentationml/2006/main">
   <p:cSld>
     <p:spTree>
@@ -8661,7 +9183,7 @@
 </p:sld>
 </file>
 
-<file path=ppt/slides/slide18.xml><?xml version="1.0" encoding="utf-8"?>
+<file path=ppt/slides/slide19.xml><?xml version="1.0" encoding="utf-8"?>
 <p:sld xmlns:a="http://schemas.openxmlformats.org/drawingml/2006/main" xmlns:r="http://schemas.openxmlformats.org/officeDocument/2006/relationships" xmlns:p="http://schemas.openxmlformats.org/presentationml/2006/main">
   <p:cSld>
     <p:spTree>
@@ -8932,125 +9454,6 @@
                 <a:sym typeface="Alegreya Bold"/>
               </a:rPr>
               <a:t>Presentations are communication tools that can be used as demonstrations, lectures, speeches, reports, and more. Mostly presented before an audience, it serves a variety of purposes, making presentations powerful tools for convicing and teaching.</a:t>
-            </a:r>
-          </a:p>
-        </p:txBody>
-      </p:sp>
-    </p:spTree>
-  </p:cSld>
-  <p:clrMapOvr>
-    <a:masterClrMapping/>
-  </p:clrMapOvr>
-</p:sld>
-</file>
-
-<file path=ppt/slides/slide19.xml><?xml version="1.0" encoding="utf-8"?>
-<p:sld xmlns:a="http://schemas.openxmlformats.org/drawingml/2006/main" xmlns:r="http://schemas.openxmlformats.org/officeDocument/2006/relationships" xmlns:p="http://schemas.openxmlformats.org/presentationml/2006/main">
-  <p:cSld>
-    <p:spTree>
-      <p:nvGrpSpPr>
-        <p:cNvPr id="1" name=""/>
-        <p:cNvGrpSpPr/>
-        <p:nvPr/>
-      </p:nvGrpSpPr>
-      <p:grpSpPr>
-        <a:xfrm>
-          <a:off x="0" y="0"/>
-          <a:ext cx="0" cy="0"/>
-          <a:chOff x="0" y="0"/>
-          <a:chExt cx="0" cy="0"/>
-        </a:xfrm>
-      </p:grpSpPr>
-      <p:sp>
-        <p:nvSpPr>
-          <p:cNvPr id="2" name="Freeform 2"/>
-          <p:cNvSpPr/>
-          <p:nvPr/>
-        </p:nvSpPr>
-        <p:spPr>
-          <a:xfrm>
-            <a:off x="0" y="0"/>
-            <a:ext cx="18288000" cy="10287000"/>
-          </a:xfrm>
-          <a:custGeom>
-            <a:avLst/>
-            <a:gdLst/>
-            <a:ahLst/>
-            <a:cxnLst/>
-            <a:rect l="l" t="t" r="r" b="b"/>
-            <a:pathLst>
-              <a:path w="18288000" h="10287000">
-                <a:moveTo>
-                  <a:pt x="0" y="0"/>
-                </a:moveTo>
-                <a:lnTo>
-                  <a:pt x="18288000" y="0"/>
-                </a:lnTo>
-                <a:lnTo>
-                  <a:pt x="18288000" y="10287000"/>
-                </a:lnTo>
-                <a:lnTo>
-                  <a:pt x="0" y="10287000"/>
-                </a:lnTo>
-                <a:lnTo>
-                  <a:pt x="0" y="0"/>
-                </a:lnTo>
-                <a:close/>
-              </a:path>
-            </a:pathLst>
-          </a:custGeom>
-          <a:blipFill>
-            <a:blip r:embed="rId2"/>
-            <a:stretch>
-              <a:fillRect l="-220" t="-9510" r="-1696" b="-11203"/>
-            </a:stretch>
-          </a:blipFill>
-        </p:spPr>
-        <p:txBody>
-          <a:bodyPr/>
-          <a:lstStyle/>
-          <a:p>
-            <a:endParaRPr lang="fr-FR"/>
-          </a:p>
-        </p:txBody>
-      </p:sp>
-      <p:sp>
-        <p:nvSpPr>
-          <p:cNvPr id="3" name="TextBox 3"/>
-          <p:cNvSpPr txBox="1"/>
-          <p:nvPr/>
-        </p:nvSpPr>
-        <p:spPr>
-          <a:xfrm>
-            <a:off x="2691138" y="3358912"/>
-            <a:ext cx="12905724" cy="3369152"/>
-          </a:xfrm>
-          <a:prstGeom prst="rect">
-            <a:avLst/>
-          </a:prstGeom>
-        </p:spPr>
-        <p:txBody>
-          <a:bodyPr lIns="0" tIns="0" rIns="0" bIns="0" rtlCol="0" anchor="t">
-            <a:spAutoFit/>
-          </a:bodyPr>
-          <a:lstStyle/>
-          <a:p>
-            <a:pPr algn="ctr">
-              <a:lnSpc>
-                <a:spcPts val="13498"/>
-              </a:lnSpc>
-            </a:pPr>
-            <a:r>
-              <a:rPr lang="en-US" sz="9641">
-                <a:solidFill>
-                  <a:srgbClr val="000000"/>
-                </a:solidFill>
-                <a:latin typeface="Bobby Jones"/>
-                <a:ea typeface="Bobby Jones"/>
-                <a:cs typeface="Bobby Jones"/>
-                <a:sym typeface="Bobby Jones"/>
-              </a:rPr>
-              <a:t>Does Anyone Have a Questions?</a:t>
             </a:r>
           </a:p>
         </p:txBody>
@@ -9857,8 +10260,8 @@
         </p:nvSpPr>
         <p:spPr>
           <a:xfrm>
-            <a:off x="2616729" y="3509275"/>
-            <a:ext cx="13054542" cy="2906500"/>
+            <a:off x="2691138" y="3358912"/>
+            <a:ext cx="12905724" cy="3369152"/>
           </a:xfrm>
           <a:prstGeom prst="rect">
             <a:avLst/>
@@ -9872,11 +10275,11 @@
           <a:p>
             <a:pPr algn="ctr">
               <a:lnSpc>
-                <a:spcPts val="23410"/>
+                <a:spcPts val="13498"/>
               </a:lnSpc>
             </a:pPr>
             <a:r>
-              <a:rPr lang="en-US" sz="16721">
+              <a:rPr lang="en-US" sz="9641">
                 <a:solidFill>
                   <a:srgbClr val="000000"/>
                 </a:solidFill>
@@ -9885,7 +10288,7 @@
                 <a:cs typeface="Bobby Jones"/>
                 <a:sym typeface="Bobby Jones"/>
               </a:rPr>
-              <a:t>Thank you</a:t>
+              <a:t>Does Anyone Have a Questions?</a:t>
             </a:r>
           </a:p>
         </p:txBody>
@@ -9898,7 +10301,7 @@
 </p:sld>
 </file>
 
-<file path=ppt/slides/slide3.xml><?xml version="1.0" encoding="utf-8"?>
+<file path=ppt/slides/slide21.xml><?xml version="1.0" encoding="utf-8"?>
 <p:sld xmlns:a="http://schemas.openxmlformats.org/drawingml/2006/main" xmlns:r="http://schemas.openxmlformats.org/officeDocument/2006/relationships" xmlns:p="http://schemas.openxmlformats.org/presentationml/2006/main">
   <p:cSld>
     <p:spTree>
@@ -9976,8 +10379,8 @@
         </p:nvSpPr>
         <p:spPr>
           <a:xfrm>
-            <a:off x="1761580" y="2521435"/>
-            <a:ext cx="14764841" cy="4939330"/>
+            <a:off x="2616729" y="3509275"/>
+            <a:ext cx="13054542" cy="2906500"/>
           </a:xfrm>
           <a:prstGeom prst="rect">
             <a:avLst/>
@@ -9991,11 +10394,11 @@
           <a:p>
             <a:pPr algn="ctr">
               <a:lnSpc>
-                <a:spcPts val="19653"/>
+                <a:spcPts val="23410"/>
               </a:lnSpc>
             </a:pPr>
             <a:r>
-              <a:rPr lang="en-US" sz="14038">
+              <a:rPr lang="en-US" sz="16721">
                 <a:solidFill>
                   <a:srgbClr val="000000"/>
                 </a:solidFill>
@@ -10004,7 +10407,7 @@
                 <a:cs typeface="Bobby Jones"/>
                 <a:sym typeface="Bobby Jones"/>
               </a:rPr>
-              <a:t>Introduction et contexte</a:t>
+              <a:t>Thank you</a:t>
             </a:r>
           </a:p>
         </p:txBody>
@@ -10017,7 +10420,7 @@
 </p:sld>
 </file>
 
-<file path=ppt/slides/slide4.xml><?xml version="1.0" encoding="utf-8"?>
+<file path=ppt/slides/slide3.xml><?xml version="1.0" encoding="utf-8"?>
 <p:sld xmlns:a="http://schemas.openxmlformats.org/drawingml/2006/main" xmlns:r="http://schemas.openxmlformats.org/officeDocument/2006/relationships" xmlns:p="http://schemas.openxmlformats.org/presentationml/2006/main">
   <p:cSld>
     <p:spTree>
@@ -10089,10 +10492,183 @@
       </p:sp>
       <p:sp>
         <p:nvSpPr>
-          <p:cNvPr id="3" name="TextBox 12">
+          <p:cNvPr id="3" name="TextBox 3"/>
+          <p:cNvSpPr txBox="1"/>
+          <p:nvPr/>
+        </p:nvSpPr>
+        <p:spPr>
+          <a:xfrm>
+            <a:off x="1761580" y="2521435"/>
+            <a:ext cx="14764841" cy="4939330"/>
+          </a:xfrm>
+          <a:prstGeom prst="rect">
+            <a:avLst/>
+          </a:prstGeom>
+        </p:spPr>
+        <p:txBody>
+          <a:bodyPr lIns="0" tIns="0" rIns="0" bIns="0" rtlCol="0" anchor="t">
+            <a:spAutoFit/>
+          </a:bodyPr>
+          <a:lstStyle/>
+          <a:p>
+            <a:pPr algn="ctr">
+              <a:lnSpc>
+                <a:spcPts val="19653"/>
+              </a:lnSpc>
+            </a:pPr>
+            <a:r>
+              <a:rPr lang="en-US" sz="14038">
+                <a:solidFill>
+                  <a:srgbClr val="000000"/>
+                </a:solidFill>
+                <a:latin typeface="Bobby Jones"/>
+                <a:ea typeface="Bobby Jones"/>
+                <a:cs typeface="Bobby Jones"/>
+                <a:sym typeface="Bobby Jones"/>
+              </a:rPr>
+              <a:t>Introduction et contexte</a:t>
+            </a:r>
+          </a:p>
+        </p:txBody>
+      </p:sp>
+    </p:spTree>
+  </p:cSld>
+  <p:clrMapOvr>
+    <a:masterClrMapping/>
+  </p:clrMapOvr>
+</p:sld>
+</file>
+
+<file path=ppt/slides/slide4.xml><?xml version="1.0" encoding="utf-8"?>
+<p:sld xmlns:a="http://schemas.openxmlformats.org/drawingml/2006/main" xmlns:r="http://schemas.openxmlformats.org/officeDocument/2006/relationships" xmlns:p="http://schemas.openxmlformats.org/presentationml/2006/main">
+  <p:cSld>
+    <p:spTree>
+      <p:nvGrpSpPr>
+        <p:cNvPr id="1" name=""/>
+        <p:cNvGrpSpPr/>
+        <p:nvPr/>
+      </p:nvGrpSpPr>
+      <p:grpSpPr>
+        <a:xfrm>
+          <a:off x="0" y="0"/>
+          <a:ext cx="0" cy="0"/>
+          <a:chOff x="0" y="0"/>
+          <a:chExt cx="0" cy="0"/>
+        </a:xfrm>
+      </p:grpSpPr>
+      <p:sp>
+        <p:nvSpPr>
+          <p:cNvPr id="2" name="Freeform 2"/>
+          <p:cNvSpPr/>
+          <p:nvPr/>
+        </p:nvSpPr>
+        <p:spPr>
+          <a:xfrm>
+            <a:off x="0" y="0"/>
+            <a:ext cx="18288000" cy="10287000"/>
+          </a:xfrm>
+          <a:custGeom>
+            <a:avLst/>
+            <a:gdLst/>
+            <a:ahLst/>
+            <a:cxnLst/>
+            <a:rect l="l" t="t" r="r" b="b"/>
+            <a:pathLst>
+              <a:path w="18288000" h="10287000">
+                <a:moveTo>
+                  <a:pt x="0" y="0"/>
+                </a:moveTo>
+                <a:lnTo>
+                  <a:pt x="18288000" y="0"/>
+                </a:lnTo>
+                <a:lnTo>
+                  <a:pt x="18288000" y="10287000"/>
+                </a:lnTo>
+                <a:lnTo>
+                  <a:pt x="0" y="10287000"/>
+                </a:lnTo>
+                <a:lnTo>
+                  <a:pt x="0" y="0"/>
+                </a:lnTo>
+                <a:close/>
+              </a:path>
+            </a:pathLst>
+          </a:custGeom>
+          <a:blipFill>
+            <a:blip r:embed="rId2"/>
+            <a:stretch>
+              <a:fillRect l="-220" t="-9510" r="-1696" b="-11203"/>
+            </a:stretch>
+          </a:blipFill>
+        </p:spPr>
+        <p:txBody>
+          <a:bodyPr/>
+          <a:lstStyle/>
+          <a:p>
+            <a:endParaRPr lang="fr-FR" dirty="0"/>
+          </a:p>
+        </p:txBody>
+      </p:sp>
+      <p:sp>
+        <p:nvSpPr>
+          <p:cNvPr id="5" name="Rectangle 4">
             <a:extLst>
               <a:ext uri="{FF2B5EF4-FFF2-40B4-BE49-F238E27FC236}">
-                <a16:creationId xmlns:a16="http://schemas.microsoft.com/office/drawing/2014/main" id="{59C9E7EE-8525-B820-B20C-2D84C256F830}"/>
+                <a16:creationId xmlns:a16="http://schemas.microsoft.com/office/drawing/2014/main" id="{6C8BBC26-983F-C560-F369-FBEC2B659228}"/>
+              </a:ext>
+            </a:extLst>
+          </p:cNvPr>
+          <p:cNvSpPr/>
+          <p:nvPr/>
+        </p:nvSpPr>
+        <p:spPr>
+          <a:xfrm>
+            <a:off x="0" y="9410700"/>
+            <a:ext cx="18288000" cy="876300"/>
+          </a:xfrm>
+          <a:prstGeom prst="rect">
+            <a:avLst/>
+          </a:prstGeom>
+          <a:solidFill>
+            <a:srgbClr val="F5F3F3"/>
+          </a:solidFill>
+          <a:ln>
+            <a:solidFill>
+              <a:srgbClr val="F5F3F3"/>
+            </a:solidFill>
+          </a:ln>
+        </p:spPr>
+        <p:style>
+          <a:lnRef idx="2">
+            <a:schemeClr val="accent1">
+              <a:shade val="15000"/>
+            </a:schemeClr>
+          </a:lnRef>
+          <a:fillRef idx="1">
+            <a:schemeClr val="accent1"/>
+          </a:fillRef>
+          <a:effectRef idx="0">
+            <a:schemeClr val="accent1"/>
+          </a:effectRef>
+          <a:fontRef idx="minor">
+            <a:schemeClr val="lt1"/>
+          </a:fontRef>
+        </p:style>
+        <p:txBody>
+          <a:bodyPr rtlCol="0" anchor="ctr"/>
+          <a:lstStyle/>
+          <a:p>
+            <a:pPr algn="ctr"/>
+            <a:endParaRPr lang="fr-FR"/>
+          </a:p>
+        </p:txBody>
+      </p:sp>
+      <p:sp>
+        <p:nvSpPr>
+          <p:cNvPr id="6" name="ZoneTexte 5">
+            <a:extLst>
+              <a:ext uri="{FF2B5EF4-FFF2-40B4-BE49-F238E27FC236}">
+                <a16:creationId xmlns:a16="http://schemas.microsoft.com/office/drawing/2014/main" id="{B55F99E1-02BE-0F98-9E56-349D08E9C75B}"/>
               </a:ext>
             </a:extLst>
           </p:cNvPr>
@@ -10101,7 +10677,347 @@
         </p:nvSpPr>
         <p:spPr>
           <a:xfrm>
-            <a:off x="3679044" y="847725"/>
+            <a:off x="609600" y="9587240"/>
+            <a:ext cx="17068800" cy="523220"/>
+          </a:xfrm>
+          <a:prstGeom prst="rect">
+            <a:avLst/>
+          </a:prstGeom>
+          <a:noFill/>
+        </p:spPr>
+        <p:txBody>
+          <a:bodyPr wrap="square" rtlCol="0">
+            <a:spAutoFit/>
+          </a:bodyPr>
+          <a:lstStyle/>
+          <a:p>
+            <a:pPr algn="ctr"/>
+            <a:r>
+              <a:rPr lang="fr-FR" sz="2800" b="1" dirty="0">
+                <a:latin typeface="Alegreya" panose="020B0604020202020204" charset="0"/>
+              </a:rPr>
+              <a:t>Introduction et complexe        </a:t>
+            </a:r>
+            <a:r>
+              <a:rPr lang="fr-FR" sz="2800" dirty="0">
+                <a:solidFill>
+                  <a:schemeClr val="bg1">
+                    <a:lumMod val="50000"/>
+                  </a:schemeClr>
+                </a:solidFill>
+                <a:latin typeface="Alegreya" panose="020B0604020202020204" charset="0"/>
+              </a:rPr>
+              <a:t>–        Développement et démonstration        –        Analyse et conclusion</a:t>
+            </a:r>
+          </a:p>
+        </p:txBody>
+      </p:sp>
+      <p:pic>
+        <p:nvPicPr>
+          <p:cNvPr id="9" name="Graphique 8" descr="Épingle contour">
+            <a:extLst>
+              <a:ext uri="{FF2B5EF4-FFF2-40B4-BE49-F238E27FC236}">
+                <a16:creationId xmlns:a16="http://schemas.microsoft.com/office/drawing/2014/main" id="{C068AAC0-443F-16C3-DA40-B6590AAFC063}"/>
+              </a:ext>
+            </a:extLst>
+          </p:cNvPr>
+          <p:cNvPicPr>
+            <a:picLocks noChangeAspect="1"/>
+          </p:cNvPicPr>
+          <p:nvPr/>
+        </p:nvPicPr>
+        <p:blipFill>
+          <a:blip r:embed="rId3">
+            <a:extLst>
+              <a:ext uri="{96DAC541-7B7A-43D3-8B79-37D633B846F1}">
+                <asvg:svgBlip xmlns:asvg="http://schemas.microsoft.com/office/drawing/2016/SVG/main" r:embed="rId4"/>
+              </a:ext>
+            </a:extLst>
+          </a:blip>
+          <a:stretch>
+            <a:fillRect/>
+          </a:stretch>
+        </p:blipFill>
+        <p:spPr>
+          <a:xfrm>
+            <a:off x="1011343" y="2799176"/>
+            <a:ext cx="1676400" cy="1676400"/>
+          </a:xfrm>
+          <a:prstGeom prst="rect">
+            <a:avLst/>
+          </a:prstGeom>
+        </p:spPr>
+      </p:pic>
+      <p:sp>
+        <p:nvSpPr>
+          <p:cNvPr id="11" name="ZoneTexte 10">
+            <a:extLst>
+              <a:ext uri="{FF2B5EF4-FFF2-40B4-BE49-F238E27FC236}">
+                <a16:creationId xmlns:a16="http://schemas.microsoft.com/office/drawing/2014/main" id="{AE6DE22C-1DF7-B7EA-63A8-73B3277B7AF5}"/>
+              </a:ext>
+            </a:extLst>
+          </p:cNvPr>
+          <p:cNvSpPr txBox="1"/>
+          <p:nvPr/>
+        </p:nvSpPr>
+        <p:spPr>
+          <a:xfrm>
+            <a:off x="2841173" y="3027776"/>
+            <a:ext cx="15414170" cy="1938992"/>
+          </a:xfrm>
+          <a:prstGeom prst="rect">
+            <a:avLst/>
+          </a:prstGeom>
+          <a:noFill/>
+        </p:spPr>
+        <p:txBody>
+          <a:bodyPr wrap="square">
+            <a:spAutoFit/>
+          </a:bodyPr>
+          <a:lstStyle/>
+          <a:p>
+            <a:pPr>
+              <a:buNone/>
+            </a:pPr>
+            <a:r>
+              <a:rPr lang="fr-FR" sz="3600" b="1" u="sng" dirty="0">
+                <a:latin typeface="Alegreya" panose="020B0604020202020204" charset="0"/>
+              </a:rPr>
+              <a:t>Contexte du projet</a:t>
+            </a:r>
+          </a:p>
+          <a:p>
+            <a:pPr>
+              <a:lnSpc>
+                <a:spcPct val="150000"/>
+              </a:lnSpc>
+            </a:pPr>
+            <a:r>
+              <a:rPr lang="fr-FR" sz="3200" dirty="0">
+                <a:latin typeface="Alegreya" panose="020B0604020202020204" charset="0"/>
+              </a:rPr>
+              <a:t>Développement d’une plateforme logicielle distribuée pour la restauration en ligne</a:t>
+            </a:r>
+          </a:p>
+          <a:p>
+            <a:pPr>
+              <a:buNone/>
+            </a:pPr>
+            <a:endParaRPr lang="fr-FR" sz="3600" u="sng" dirty="0">
+              <a:latin typeface="Alegreya" panose="020B0604020202020204" charset="0"/>
+            </a:endParaRPr>
+          </a:p>
+        </p:txBody>
+      </p:sp>
+      <p:pic>
+        <p:nvPicPr>
+          <p:cNvPr id="15" name="Graphique 14" descr="Mille contour">
+            <a:extLst>
+              <a:ext uri="{FF2B5EF4-FFF2-40B4-BE49-F238E27FC236}">
+                <a16:creationId xmlns:a16="http://schemas.microsoft.com/office/drawing/2014/main" id="{5AC2ABCD-E957-C411-0D40-F3FB47B47E2A}"/>
+              </a:ext>
+            </a:extLst>
+          </p:cNvPr>
+          <p:cNvPicPr>
+            <a:picLocks noChangeAspect="1"/>
+          </p:cNvPicPr>
+          <p:nvPr/>
+        </p:nvPicPr>
+        <p:blipFill>
+          <a:blip r:embed="rId5">
+            <a:extLst>
+              <a:ext uri="{96DAC541-7B7A-43D3-8B79-37D633B846F1}">
+                <asvg:svgBlip xmlns:asvg="http://schemas.microsoft.com/office/drawing/2016/SVG/main" r:embed="rId6"/>
+              </a:ext>
+            </a:extLst>
+          </a:blip>
+          <a:stretch>
+            <a:fillRect/>
+          </a:stretch>
+        </p:blipFill>
+        <p:spPr>
+          <a:xfrm>
+            <a:off x="1011343" y="4996276"/>
+            <a:ext cx="1676399" cy="1676399"/>
+          </a:xfrm>
+          <a:prstGeom prst="rect">
+            <a:avLst/>
+          </a:prstGeom>
+        </p:spPr>
+      </p:pic>
+      <p:sp>
+        <p:nvSpPr>
+          <p:cNvPr id="16" name="ZoneTexte 15">
+            <a:extLst>
+              <a:ext uri="{FF2B5EF4-FFF2-40B4-BE49-F238E27FC236}">
+                <a16:creationId xmlns:a16="http://schemas.microsoft.com/office/drawing/2014/main" id="{359BD1CD-BD6D-217C-9A0A-12579CF6E05B}"/>
+              </a:ext>
+            </a:extLst>
+          </p:cNvPr>
+          <p:cNvSpPr txBox="1"/>
+          <p:nvPr/>
+        </p:nvSpPr>
+        <p:spPr>
+          <a:xfrm>
+            <a:off x="2841173" y="5051185"/>
+            <a:ext cx="15414170" cy="1938992"/>
+          </a:xfrm>
+          <a:prstGeom prst="rect">
+            <a:avLst/>
+          </a:prstGeom>
+          <a:noFill/>
+        </p:spPr>
+        <p:txBody>
+          <a:bodyPr wrap="square">
+            <a:spAutoFit/>
+          </a:bodyPr>
+          <a:lstStyle/>
+          <a:p>
+            <a:pPr>
+              <a:buNone/>
+            </a:pPr>
+            <a:r>
+              <a:rPr lang="fr-FR" sz="3600" b="1" u="sng" dirty="0">
+                <a:latin typeface="Alegreya" panose="020B0604020202020204" charset="0"/>
+              </a:rPr>
+              <a:t>Objectif du projet</a:t>
+            </a:r>
+          </a:p>
+          <a:p>
+            <a:pPr>
+              <a:lnSpc>
+                <a:spcPct val="150000"/>
+              </a:lnSpc>
+            </a:pPr>
+            <a:r>
+              <a:rPr lang="fr-FR" sz="3200" dirty="0">
+                <a:latin typeface="Alegreya" panose="020B0604020202020204" charset="0"/>
+              </a:rPr>
+              <a:t>Optimiser la gestion des commandes et des livraisons</a:t>
+            </a:r>
+          </a:p>
+          <a:p>
+            <a:pPr>
+              <a:buNone/>
+            </a:pPr>
+            <a:endParaRPr lang="fr-FR" sz="3600" u="sng" dirty="0">
+              <a:latin typeface="Alegreya" panose="020B0604020202020204" charset="0"/>
+            </a:endParaRPr>
+          </a:p>
+        </p:txBody>
+      </p:sp>
+      <p:pic>
+        <p:nvPicPr>
+          <p:cNvPr id="18" name="Graphique 17" descr="Utilisateur contour">
+            <a:extLst>
+              <a:ext uri="{FF2B5EF4-FFF2-40B4-BE49-F238E27FC236}">
+                <a16:creationId xmlns:a16="http://schemas.microsoft.com/office/drawing/2014/main" id="{96CC544B-4F4A-489D-DC9A-85C883A07904}"/>
+              </a:ext>
+            </a:extLst>
+          </p:cNvPr>
+          <p:cNvPicPr>
+            <a:picLocks noChangeAspect="1"/>
+          </p:cNvPicPr>
+          <p:nvPr/>
+        </p:nvPicPr>
+        <p:blipFill>
+          <a:blip r:embed="rId7">
+            <a:extLst>
+              <a:ext uri="{96DAC541-7B7A-43D3-8B79-37D633B846F1}">
+                <asvg:svgBlip xmlns:asvg="http://schemas.microsoft.com/office/drawing/2016/SVG/main" r:embed="rId8"/>
+              </a:ext>
+            </a:extLst>
+          </a:blip>
+          <a:stretch>
+            <a:fillRect/>
+          </a:stretch>
+        </p:blipFill>
+        <p:spPr>
+          <a:xfrm>
+            <a:off x="1011343" y="6906981"/>
+            <a:ext cx="1676400" cy="1676400"/>
+          </a:xfrm>
+          <a:prstGeom prst="rect">
+            <a:avLst/>
+          </a:prstGeom>
+        </p:spPr>
+      </p:pic>
+      <p:sp>
+        <p:nvSpPr>
+          <p:cNvPr id="19" name="ZoneTexte 18">
+            <a:extLst>
+              <a:ext uri="{FF2B5EF4-FFF2-40B4-BE49-F238E27FC236}">
+                <a16:creationId xmlns:a16="http://schemas.microsoft.com/office/drawing/2014/main" id="{59DC83E2-0858-F03D-C11F-A8989A0A62C1}"/>
+              </a:ext>
+            </a:extLst>
+          </p:cNvPr>
+          <p:cNvSpPr txBox="1"/>
+          <p:nvPr/>
+        </p:nvSpPr>
+        <p:spPr>
+          <a:xfrm>
+            <a:off x="2873830" y="7110356"/>
+            <a:ext cx="15414170" cy="1938992"/>
+          </a:xfrm>
+          <a:prstGeom prst="rect">
+            <a:avLst/>
+          </a:prstGeom>
+          <a:noFill/>
+        </p:spPr>
+        <p:txBody>
+          <a:bodyPr wrap="square">
+            <a:spAutoFit/>
+          </a:bodyPr>
+          <a:lstStyle/>
+          <a:p>
+            <a:pPr>
+              <a:buNone/>
+            </a:pPr>
+            <a:r>
+              <a:rPr lang="fr-FR" sz="3600" b="1" u="sng" dirty="0">
+                <a:latin typeface="Alegreya" panose="020B0604020202020204" charset="0"/>
+              </a:rPr>
+              <a:t>Intégration de plusieurs acteurs</a:t>
+            </a:r>
+          </a:p>
+          <a:p>
+            <a:pPr>
+              <a:lnSpc>
+                <a:spcPct val="150000"/>
+              </a:lnSpc>
+            </a:pPr>
+            <a:r>
+              <a:rPr lang="fr-FR" sz="3200" dirty="0">
+                <a:latin typeface="Alegreya" panose="020B0604020202020204" charset="0"/>
+              </a:rPr>
+              <a:t>Clients, restaurateurs, livreurs, développeurs tiers, services commerciaux et techniques</a:t>
+            </a:r>
+          </a:p>
+          <a:p>
+            <a:pPr>
+              <a:buNone/>
+            </a:pPr>
+            <a:endParaRPr lang="fr-FR" sz="3600" u="sng" dirty="0">
+              <a:latin typeface="Alegreya" panose="020B0604020202020204" charset="0"/>
+            </a:endParaRPr>
+          </a:p>
+        </p:txBody>
+      </p:sp>
+      <p:sp>
+        <p:nvSpPr>
+          <p:cNvPr id="22" name="TextBox 12">
+            <a:extLst>
+              <a:ext uri="{FF2B5EF4-FFF2-40B4-BE49-F238E27FC236}">
+                <a16:creationId xmlns:a16="http://schemas.microsoft.com/office/drawing/2014/main" id="{4203723E-2AEC-92D2-25B7-9FE24744DC24}"/>
+              </a:ext>
+            </a:extLst>
+          </p:cNvPr>
+          <p:cNvSpPr txBox="1"/>
+          <p:nvPr/>
+        </p:nvSpPr>
+        <p:spPr>
+          <a:xfrm>
+            <a:off x="3679043" y="560460"/>
             <a:ext cx="10929913" cy="1332031"/>
           </a:xfrm>
           <a:prstGeom prst="rect">
@@ -10155,6 +11071,86 @@
           </a:p>
         </p:txBody>
       </p:sp>
+      <p:sp>
+        <p:nvSpPr>
+          <p:cNvPr id="23" name="TextBox 12">
+            <a:extLst>
+              <a:ext uri="{FF2B5EF4-FFF2-40B4-BE49-F238E27FC236}">
+                <a16:creationId xmlns:a16="http://schemas.microsoft.com/office/drawing/2014/main" id="{35D00DC7-F25F-A645-4811-C8CA9D00DE82}"/>
+              </a:ext>
+            </a:extLst>
+          </p:cNvPr>
+          <p:cNvSpPr txBox="1"/>
+          <p:nvPr/>
+        </p:nvSpPr>
+        <p:spPr>
+          <a:xfrm>
+            <a:off x="7048499" y="1046235"/>
+            <a:ext cx="4191000" cy="1184748"/>
+          </a:xfrm>
+          <a:prstGeom prst="rect">
+            <a:avLst/>
+          </a:prstGeom>
+        </p:spPr>
+        <p:txBody>
+          <a:bodyPr wrap="square" lIns="0" tIns="0" rIns="0" bIns="0" rtlCol="0" anchor="ctr">
+            <a:spAutoFit/>
+          </a:bodyPr>
+          <a:lstStyle/>
+          <a:p>
+            <a:pPr algn="ctr">
+              <a:lnSpc>
+                <a:spcPts val="11432"/>
+              </a:lnSpc>
+            </a:pPr>
+            <a:r>
+              <a:rPr lang="en-US" sz="3000" dirty="0" err="1">
+                <a:solidFill>
+                  <a:srgbClr val="000000"/>
+                </a:solidFill>
+                <a:latin typeface="Bobby Jones"/>
+                <a:ea typeface="Bobby Jones"/>
+                <a:cs typeface="Bobby Jones"/>
+                <a:sym typeface="Bobby Jones"/>
+              </a:rPr>
+              <a:t>Objectifs</a:t>
+            </a:r>
+            <a:r>
+              <a:rPr lang="en-US" sz="3000" dirty="0">
+                <a:solidFill>
+                  <a:srgbClr val="000000"/>
+                </a:solidFill>
+                <a:latin typeface="Bobby Jones"/>
+                <a:ea typeface="Bobby Jones"/>
+                <a:cs typeface="Bobby Jones"/>
+                <a:sym typeface="Bobby Jones"/>
+              </a:rPr>
+              <a:t> </a:t>
+            </a:r>
+            <a:r>
+              <a:rPr lang="en-US" sz="3000" dirty="0" err="1">
+                <a:solidFill>
+                  <a:srgbClr val="000000"/>
+                </a:solidFill>
+                <a:latin typeface="Bobby Jones"/>
+                <a:ea typeface="Bobby Jones"/>
+                <a:cs typeface="Bobby Jones"/>
+                <a:sym typeface="Bobby Jones"/>
+              </a:rPr>
+              <a:t>fonctionnels</a:t>
+            </a:r>
+            <a:endParaRPr lang="en-US" sz="3000" dirty="0">
+              <a:solidFill>
+                <a:srgbClr val="000000"/>
+              </a:solidFill>
+              <a:latin typeface="Bobby Jones"/>
+              <a:ea typeface="Bobby Jones"/>
+              <a:cs typeface="Bobby Jones"/>
+              <a:sym typeface="Bobby Jones"/>
+            </a:endParaRPr>
+          </a:p>
+        </p:txBody>
+      </p:sp>
     </p:spTree>
   </p:cSld>
   <p:clrMapOvr>
@@ -10164,6 +11160,881 @@
 </file>
 
 <file path=ppt/slides/slide5.xml><?xml version="1.0" encoding="utf-8"?>
+<p:sld xmlns:a="http://schemas.openxmlformats.org/drawingml/2006/main" xmlns:r="http://schemas.openxmlformats.org/officeDocument/2006/relationships" xmlns:p="http://schemas.openxmlformats.org/presentationml/2006/main">
+  <p:cSld>
+    <p:spTree>
+      <p:nvGrpSpPr>
+        <p:cNvPr id="1" name="">
+          <a:extLst>
+            <a:ext uri="{FF2B5EF4-FFF2-40B4-BE49-F238E27FC236}">
+              <a16:creationId xmlns:a16="http://schemas.microsoft.com/office/drawing/2014/main" id="{296AF5C7-B838-BA2E-2071-736EBBFF211A}"/>
+            </a:ext>
+          </a:extLst>
+        </p:cNvPr>
+        <p:cNvGrpSpPr/>
+        <p:nvPr/>
+      </p:nvGrpSpPr>
+      <p:grpSpPr>
+        <a:xfrm>
+          <a:off x="0" y="0"/>
+          <a:ext cx="0" cy="0"/>
+          <a:chOff x="0" y="0"/>
+          <a:chExt cx="0" cy="0"/>
+        </a:xfrm>
+      </p:grpSpPr>
+      <p:sp>
+        <p:nvSpPr>
+          <p:cNvPr id="2" name="Freeform 2">
+            <a:extLst>
+              <a:ext uri="{FF2B5EF4-FFF2-40B4-BE49-F238E27FC236}">
+                <a16:creationId xmlns:a16="http://schemas.microsoft.com/office/drawing/2014/main" id="{21B1FCFF-E3B4-E305-E098-FB0360067B94}"/>
+              </a:ext>
+            </a:extLst>
+          </p:cNvPr>
+          <p:cNvSpPr/>
+          <p:nvPr/>
+        </p:nvSpPr>
+        <p:spPr>
+          <a:xfrm>
+            <a:off x="0" y="0"/>
+            <a:ext cx="18288000" cy="10287000"/>
+          </a:xfrm>
+          <a:custGeom>
+            <a:avLst/>
+            <a:gdLst/>
+            <a:ahLst/>
+            <a:cxnLst/>
+            <a:rect l="l" t="t" r="r" b="b"/>
+            <a:pathLst>
+              <a:path w="18288000" h="10287000">
+                <a:moveTo>
+                  <a:pt x="0" y="0"/>
+                </a:moveTo>
+                <a:lnTo>
+                  <a:pt x="18288000" y="0"/>
+                </a:lnTo>
+                <a:lnTo>
+                  <a:pt x="18288000" y="10287000"/>
+                </a:lnTo>
+                <a:lnTo>
+                  <a:pt x="0" y="10287000"/>
+                </a:lnTo>
+                <a:lnTo>
+                  <a:pt x="0" y="0"/>
+                </a:lnTo>
+                <a:close/>
+              </a:path>
+            </a:pathLst>
+          </a:custGeom>
+          <a:blipFill>
+            <a:blip r:embed="rId2"/>
+            <a:stretch>
+              <a:fillRect l="-220" t="-9510" r="-1696" b="-11203"/>
+            </a:stretch>
+          </a:blipFill>
+        </p:spPr>
+        <p:txBody>
+          <a:bodyPr/>
+          <a:lstStyle/>
+          <a:p>
+            <a:endParaRPr lang="fr-FR" dirty="0"/>
+          </a:p>
+        </p:txBody>
+      </p:sp>
+      <p:sp>
+        <p:nvSpPr>
+          <p:cNvPr id="3" name="TextBox 12">
+            <a:extLst>
+              <a:ext uri="{FF2B5EF4-FFF2-40B4-BE49-F238E27FC236}">
+                <a16:creationId xmlns:a16="http://schemas.microsoft.com/office/drawing/2014/main" id="{74083DFF-E818-23F6-E50E-C6A4AFC99743}"/>
+              </a:ext>
+            </a:extLst>
+          </p:cNvPr>
+          <p:cNvSpPr txBox="1"/>
+          <p:nvPr/>
+        </p:nvSpPr>
+        <p:spPr>
+          <a:xfrm>
+            <a:off x="3679043" y="560460"/>
+            <a:ext cx="10929913" cy="1332031"/>
+          </a:xfrm>
+          <a:prstGeom prst="rect">
+            <a:avLst/>
+          </a:prstGeom>
+        </p:spPr>
+        <p:txBody>
+          <a:bodyPr lIns="0" tIns="0" rIns="0" bIns="0" rtlCol="0" anchor="t">
+            <a:spAutoFit/>
+          </a:bodyPr>
+          <a:lstStyle/>
+          <a:p>
+            <a:pPr algn="ctr">
+              <a:lnSpc>
+                <a:spcPts val="11432"/>
+              </a:lnSpc>
+            </a:pPr>
+            <a:r>
+              <a:rPr lang="en-US" sz="8165" dirty="0">
+                <a:solidFill>
+                  <a:srgbClr val="000000"/>
+                </a:solidFill>
+                <a:latin typeface="Bobby Jones"/>
+                <a:ea typeface="Bobby Jones"/>
+                <a:cs typeface="Bobby Jones"/>
+                <a:sym typeface="Bobby Jones"/>
+              </a:rPr>
+              <a:t>﻿Rappel du </a:t>
+            </a:r>
+            <a:r>
+              <a:rPr lang="en-US" sz="8165" dirty="0" err="1">
+                <a:solidFill>
+                  <a:srgbClr val="000000"/>
+                </a:solidFill>
+                <a:latin typeface="Bobby Jones"/>
+                <a:ea typeface="Bobby Jones"/>
+                <a:cs typeface="Bobby Jones"/>
+                <a:sym typeface="Bobby Jones"/>
+              </a:rPr>
+              <a:t>besoin</a:t>
+            </a:r>
+            <a:endParaRPr lang="en-US" sz="8165" dirty="0">
+              <a:solidFill>
+                <a:srgbClr val="000000"/>
+              </a:solidFill>
+              <a:latin typeface="Bobby Jones"/>
+              <a:ea typeface="Bobby Jones"/>
+              <a:cs typeface="Bobby Jones"/>
+              <a:sym typeface="Bobby Jones"/>
+            </a:endParaRPr>
+          </a:p>
+        </p:txBody>
+      </p:sp>
+      <p:sp>
+        <p:nvSpPr>
+          <p:cNvPr id="4" name="TextBox 12">
+            <a:extLst>
+              <a:ext uri="{FF2B5EF4-FFF2-40B4-BE49-F238E27FC236}">
+                <a16:creationId xmlns:a16="http://schemas.microsoft.com/office/drawing/2014/main" id="{D2CA2140-578B-C79E-C300-AA3E3B3A354D}"/>
+              </a:ext>
+            </a:extLst>
+          </p:cNvPr>
+          <p:cNvSpPr txBox="1"/>
+          <p:nvPr/>
+        </p:nvSpPr>
+        <p:spPr>
+          <a:xfrm>
+            <a:off x="7048499" y="1046235"/>
+            <a:ext cx="4191000" cy="1184748"/>
+          </a:xfrm>
+          <a:prstGeom prst="rect">
+            <a:avLst/>
+          </a:prstGeom>
+        </p:spPr>
+        <p:txBody>
+          <a:bodyPr wrap="square" lIns="0" tIns="0" rIns="0" bIns="0" rtlCol="0" anchor="ctr">
+            <a:spAutoFit/>
+          </a:bodyPr>
+          <a:lstStyle/>
+          <a:p>
+            <a:pPr algn="ctr">
+              <a:lnSpc>
+                <a:spcPts val="11432"/>
+              </a:lnSpc>
+            </a:pPr>
+            <a:r>
+              <a:rPr lang="en-US" sz="3000" dirty="0" err="1">
+                <a:solidFill>
+                  <a:srgbClr val="000000"/>
+                </a:solidFill>
+                <a:latin typeface="Bobby Jones"/>
+                <a:ea typeface="Bobby Jones"/>
+                <a:cs typeface="Bobby Jones"/>
+                <a:sym typeface="Bobby Jones"/>
+              </a:rPr>
+              <a:t>Objectifs</a:t>
+            </a:r>
+            <a:r>
+              <a:rPr lang="en-US" sz="3000" dirty="0">
+                <a:solidFill>
+                  <a:srgbClr val="000000"/>
+                </a:solidFill>
+                <a:latin typeface="Bobby Jones"/>
+                <a:ea typeface="Bobby Jones"/>
+                <a:cs typeface="Bobby Jones"/>
+                <a:sym typeface="Bobby Jones"/>
+              </a:rPr>
+              <a:t> </a:t>
+            </a:r>
+            <a:r>
+              <a:rPr lang="en-US" sz="3000" dirty="0" err="1">
+                <a:solidFill>
+                  <a:srgbClr val="000000"/>
+                </a:solidFill>
+                <a:latin typeface="Bobby Jones"/>
+                <a:ea typeface="Bobby Jones"/>
+                <a:cs typeface="Bobby Jones"/>
+                <a:sym typeface="Bobby Jones"/>
+              </a:rPr>
+              <a:t>fonctionnels</a:t>
+            </a:r>
+            <a:endParaRPr lang="en-US" sz="3000" dirty="0">
+              <a:solidFill>
+                <a:srgbClr val="000000"/>
+              </a:solidFill>
+              <a:latin typeface="Bobby Jones"/>
+              <a:ea typeface="Bobby Jones"/>
+              <a:cs typeface="Bobby Jones"/>
+              <a:sym typeface="Bobby Jones"/>
+            </a:endParaRPr>
+          </a:p>
+        </p:txBody>
+      </p:sp>
+      <p:sp>
+        <p:nvSpPr>
+          <p:cNvPr id="5" name="Rectangle 4">
+            <a:extLst>
+              <a:ext uri="{FF2B5EF4-FFF2-40B4-BE49-F238E27FC236}">
+                <a16:creationId xmlns:a16="http://schemas.microsoft.com/office/drawing/2014/main" id="{95A552AF-78DF-093F-FD9C-52C0531315E0}"/>
+              </a:ext>
+            </a:extLst>
+          </p:cNvPr>
+          <p:cNvSpPr/>
+          <p:nvPr/>
+        </p:nvSpPr>
+        <p:spPr>
+          <a:xfrm>
+            <a:off x="0" y="9410700"/>
+            <a:ext cx="18288000" cy="876300"/>
+          </a:xfrm>
+          <a:prstGeom prst="rect">
+            <a:avLst/>
+          </a:prstGeom>
+          <a:solidFill>
+            <a:srgbClr val="F5F3F3"/>
+          </a:solidFill>
+          <a:ln>
+            <a:solidFill>
+              <a:srgbClr val="F5F3F3"/>
+            </a:solidFill>
+          </a:ln>
+        </p:spPr>
+        <p:style>
+          <a:lnRef idx="2">
+            <a:schemeClr val="accent1">
+              <a:shade val="15000"/>
+            </a:schemeClr>
+          </a:lnRef>
+          <a:fillRef idx="1">
+            <a:schemeClr val="accent1"/>
+          </a:fillRef>
+          <a:effectRef idx="0">
+            <a:schemeClr val="accent1"/>
+          </a:effectRef>
+          <a:fontRef idx="minor">
+            <a:schemeClr val="lt1"/>
+          </a:fontRef>
+        </p:style>
+        <p:txBody>
+          <a:bodyPr rtlCol="0" anchor="ctr"/>
+          <a:lstStyle/>
+          <a:p>
+            <a:pPr algn="ctr"/>
+            <a:endParaRPr lang="fr-FR"/>
+          </a:p>
+        </p:txBody>
+      </p:sp>
+      <p:sp>
+        <p:nvSpPr>
+          <p:cNvPr id="6" name="ZoneTexte 5">
+            <a:extLst>
+              <a:ext uri="{FF2B5EF4-FFF2-40B4-BE49-F238E27FC236}">
+                <a16:creationId xmlns:a16="http://schemas.microsoft.com/office/drawing/2014/main" id="{26406EE5-BD9A-D697-77EB-091F0339C5CB}"/>
+              </a:ext>
+            </a:extLst>
+          </p:cNvPr>
+          <p:cNvSpPr txBox="1"/>
+          <p:nvPr/>
+        </p:nvSpPr>
+        <p:spPr>
+          <a:xfrm>
+            <a:off x="609600" y="9587240"/>
+            <a:ext cx="17068800" cy="523220"/>
+          </a:xfrm>
+          <a:prstGeom prst="rect">
+            <a:avLst/>
+          </a:prstGeom>
+          <a:noFill/>
+        </p:spPr>
+        <p:txBody>
+          <a:bodyPr wrap="square" rtlCol="0">
+            <a:spAutoFit/>
+          </a:bodyPr>
+          <a:lstStyle/>
+          <a:p>
+            <a:pPr algn="ctr"/>
+            <a:r>
+              <a:rPr lang="fr-FR" sz="2800" b="1" dirty="0">
+                <a:latin typeface="Alegreya" panose="020B0604020202020204" charset="0"/>
+              </a:rPr>
+              <a:t>Introduction et complexe        </a:t>
+            </a:r>
+            <a:r>
+              <a:rPr lang="fr-FR" sz="2800" dirty="0">
+                <a:solidFill>
+                  <a:schemeClr val="bg1">
+                    <a:lumMod val="50000"/>
+                  </a:schemeClr>
+                </a:solidFill>
+                <a:latin typeface="Alegreya" panose="020B0604020202020204" charset="0"/>
+              </a:rPr>
+              <a:t>–        Développement et démonstration        –        Analyse et conclusion</a:t>
+            </a:r>
+          </a:p>
+        </p:txBody>
+      </p:sp>
+      <p:sp>
+        <p:nvSpPr>
+          <p:cNvPr id="7" name="ZoneTexte 6">
+            <a:extLst>
+              <a:ext uri="{FF2B5EF4-FFF2-40B4-BE49-F238E27FC236}">
+                <a16:creationId xmlns:a16="http://schemas.microsoft.com/office/drawing/2014/main" id="{43D20655-5781-AFDB-945E-50CE221008EF}"/>
+              </a:ext>
+            </a:extLst>
+          </p:cNvPr>
+          <p:cNvSpPr txBox="1"/>
+          <p:nvPr/>
+        </p:nvSpPr>
+        <p:spPr>
+          <a:xfrm>
+            <a:off x="10820404" y="7252737"/>
+            <a:ext cx="7178040" cy="1569660"/>
+          </a:xfrm>
+          <a:prstGeom prst="rect">
+            <a:avLst/>
+          </a:prstGeom>
+          <a:noFill/>
+        </p:spPr>
+        <p:txBody>
+          <a:bodyPr wrap="square" rtlCol="0">
+            <a:spAutoFit/>
+          </a:bodyPr>
+          <a:lstStyle/>
+          <a:p>
+            <a:pPr>
+              <a:buNone/>
+            </a:pPr>
+            <a:r>
+              <a:rPr lang="fr-FR" sz="3200" b="1" u="sng" dirty="0">
+                <a:latin typeface="Alegreya" panose="020B0604020202020204" charset="0"/>
+              </a:rPr>
+              <a:t>Service technique</a:t>
+            </a:r>
+          </a:p>
+          <a:p>
+            <a:pPr marL="457200" indent="-457200">
+              <a:buFont typeface="Symbol" panose="05050102010706020507" pitchFamily="18" charset="2"/>
+              <a:buChar char="®"/>
+            </a:pPr>
+            <a:r>
+              <a:rPr lang="fr-FR" sz="3200" dirty="0">
+                <a:latin typeface="Alegreya" panose="020B0604020202020204" charset="0"/>
+              </a:rPr>
+              <a:t> Supervision, monitoring, gestion des performances</a:t>
+            </a:r>
+          </a:p>
+        </p:txBody>
+      </p:sp>
+      <p:pic>
+        <p:nvPicPr>
+          <p:cNvPr id="10" name="Graphique 9" descr="Personne s'alimentant contour">
+            <a:extLst>
+              <a:ext uri="{FF2B5EF4-FFF2-40B4-BE49-F238E27FC236}">
+                <a16:creationId xmlns:a16="http://schemas.microsoft.com/office/drawing/2014/main" id="{5F30FC6C-65E9-1C3C-3571-51FA8048E129}"/>
+              </a:ext>
+            </a:extLst>
+          </p:cNvPr>
+          <p:cNvPicPr>
+            <a:picLocks noChangeAspect="1"/>
+          </p:cNvPicPr>
+          <p:nvPr/>
+        </p:nvPicPr>
+        <p:blipFill>
+          <a:blip r:embed="rId3">
+            <a:extLst>
+              <a:ext uri="{96DAC541-7B7A-43D3-8B79-37D633B846F1}">
+                <asvg:svgBlip xmlns:asvg="http://schemas.microsoft.com/office/drawing/2016/SVG/main" r:embed="rId4"/>
+              </a:ext>
+            </a:extLst>
+          </a:blip>
+          <a:stretch>
+            <a:fillRect/>
+          </a:stretch>
+        </p:blipFill>
+        <p:spPr>
+          <a:xfrm>
+            <a:off x="609600" y="3027481"/>
+            <a:ext cx="1676400" cy="1676400"/>
+          </a:xfrm>
+          <a:prstGeom prst="rect">
+            <a:avLst/>
+          </a:prstGeom>
+        </p:spPr>
+      </p:pic>
+      <p:sp>
+        <p:nvSpPr>
+          <p:cNvPr id="14" name="ZoneTexte 13">
+            <a:extLst>
+              <a:ext uri="{FF2B5EF4-FFF2-40B4-BE49-F238E27FC236}">
+                <a16:creationId xmlns:a16="http://schemas.microsoft.com/office/drawing/2014/main" id="{35753CDA-C654-A37A-5FBD-0E7D378FAE93}"/>
+              </a:ext>
+            </a:extLst>
+          </p:cNvPr>
+          <p:cNvSpPr txBox="1"/>
+          <p:nvPr/>
+        </p:nvSpPr>
+        <p:spPr>
+          <a:xfrm>
+            <a:off x="2514600" y="3027481"/>
+            <a:ext cx="5943600" cy="2123658"/>
+          </a:xfrm>
+          <a:prstGeom prst="rect">
+            <a:avLst/>
+          </a:prstGeom>
+          <a:noFill/>
+        </p:spPr>
+        <p:txBody>
+          <a:bodyPr wrap="square">
+            <a:spAutoFit/>
+          </a:bodyPr>
+          <a:lstStyle/>
+          <a:p>
+            <a:r>
+              <a:rPr lang="fr-FR" sz="3200" b="1" u="sng" dirty="0">
+                <a:latin typeface="Alegreya" panose="020B0604020202020204" charset="0"/>
+              </a:rPr>
+              <a:t>Utilisateurs finaux</a:t>
+            </a:r>
+          </a:p>
+          <a:p>
+            <a:pPr marL="285750" indent="-285750">
+              <a:buFont typeface="Symbol" panose="05050102010706020507" pitchFamily="18" charset="2"/>
+              <a:buChar char="®"/>
+            </a:pPr>
+            <a:r>
+              <a:rPr lang="fr-FR" sz="3200" dirty="0">
+                <a:latin typeface="Alegreya" panose="020B0604020202020204" charset="0"/>
+              </a:rPr>
+              <a:t> Commander, payer, suivre une livraison</a:t>
+            </a:r>
+          </a:p>
+          <a:p>
+            <a:pPr marL="285750" indent="-285750">
+              <a:buFont typeface="Symbol" panose="05050102010706020507" pitchFamily="18" charset="2"/>
+              <a:buChar char="®"/>
+            </a:pPr>
+            <a:r>
+              <a:rPr lang="fr-FR" sz="3200" dirty="0">
+                <a:latin typeface="Alegreya" panose="020B0604020202020204" charset="0"/>
+              </a:rPr>
+              <a:t> Parrainage et notifications</a:t>
+            </a:r>
+            <a:endParaRPr lang="fr-FR" sz="3200" dirty="0"/>
+          </a:p>
+        </p:txBody>
+      </p:sp>
+      <p:pic>
+        <p:nvPicPr>
+          <p:cNvPr id="16" name="Graphique 15" descr="Couverts de table  contour">
+            <a:extLst>
+              <a:ext uri="{FF2B5EF4-FFF2-40B4-BE49-F238E27FC236}">
+                <a16:creationId xmlns:a16="http://schemas.microsoft.com/office/drawing/2014/main" id="{5C898455-2AC5-C31B-8957-3FE5DF42570D}"/>
+              </a:ext>
+            </a:extLst>
+          </p:cNvPr>
+          <p:cNvPicPr>
+            <a:picLocks noChangeAspect="1"/>
+          </p:cNvPicPr>
+          <p:nvPr/>
+        </p:nvPicPr>
+        <p:blipFill>
+          <a:blip r:embed="rId5">
+            <a:extLst>
+              <a:ext uri="{96DAC541-7B7A-43D3-8B79-37D633B846F1}">
+                <asvg:svgBlip xmlns:asvg="http://schemas.microsoft.com/office/drawing/2016/SVG/main" r:embed="rId6"/>
+              </a:ext>
+            </a:extLst>
+          </a:blip>
+          <a:stretch>
+            <a:fillRect/>
+          </a:stretch>
+        </p:blipFill>
+        <p:spPr>
+          <a:xfrm>
+            <a:off x="609600" y="5393117"/>
+            <a:ext cx="1676401" cy="1676401"/>
+          </a:xfrm>
+          <a:prstGeom prst="rect">
+            <a:avLst/>
+          </a:prstGeom>
+        </p:spPr>
+      </p:pic>
+      <p:sp>
+        <p:nvSpPr>
+          <p:cNvPr id="18" name="ZoneTexte 17">
+            <a:extLst>
+              <a:ext uri="{FF2B5EF4-FFF2-40B4-BE49-F238E27FC236}">
+                <a16:creationId xmlns:a16="http://schemas.microsoft.com/office/drawing/2014/main" id="{ABF6825B-9AC1-D65C-CFA6-0F1A062E008F}"/>
+              </a:ext>
+            </a:extLst>
+          </p:cNvPr>
+          <p:cNvSpPr txBox="1"/>
+          <p:nvPr/>
+        </p:nvSpPr>
+        <p:spPr>
+          <a:xfrm>
+            <a:off x="2514600" y="5381623"/>
+            <a:ext cx="5943600" cy="1631216"/>
+          </a:xfrm>
+          <a:prstGeom prst="rect">
+            <a:avLst/>
+          </a:prstGeom>
+          <a:noFill/>
+        </p:spPr>
+        <p:txBody>
+          <a:bodyPr wrap="square">
+            <a:spAutoFit/>
+          </a:bodyPr>
+          <a:lstStyle/>
+          <a:p>
+            <a:r>
+              <a:rPr lang="fr-FR" sz="3200" b="1" u="sng" dirty="0">
+                <a:latin typeface="Alegreya" panose="020B0604020202020204" charset="0"/>
+              </a:rPr>
+              <a:t>Restaurateurs</a:t>
+            </a:r>
+          </a:p>
+          <a:p>
+            <a:pPr marL="285750" indent="-285750">
+              <a:buFont typeface="Symbol" panose="05050102010706020507" pitchFamily="18" charset="2"/>
+              <a:buChar char=""/>
+            </a:pPr>
+            <a:r>
+              <a:rPr lang="fr-FR" sz="3200" dirty="0">
+                <a:latin typeface="Alegreya" panose="020B0604020202020204" charset="0"/>
+              </a:rPr>
+              <a:t> Gérer menus, commandes et statistiques</a:t>
+            </a:r>
+            <a:endParaRPr lang="fr-FR" sz="3200" dirty="0"/>
+          </a:p>
+        </p:txBody>
+      </p:sp>
+      <p:pic>
+        <p:nvPicPr>
+          <p:cNvPr id="20" name="Graphique 19" descr="Cyclisme contour">
+            <a:extLst>
+              <a:ext uri="{FF2B5EF4-FFF2-40B4-BE49-F238E27FC236}">
+                <a16:creationId xmlns:a16="http://schemas.microsoft.com/office/drawing/2014/main" id="{0989C6F6-FC14-1E7C-085A-A996F2F1342B}"/>
+              </a:ext>
+            </a:extLst>
+          </p:cNvPr>
+          <p:cNvPicPr>
+            <a:picLocks noChangeAspect="1"/>
+          </p:cNvPicPr>
+          <p:nvPr/>
+        </p:nvPicPr>
+        <p:blipFill>
+          <a:blip r:embed="rId7">
+            <a:extLst>
+              <a:ext uri="{96DAC541-7B7A-43D3-8B79-37D633B846F1}">
+                <asvg:svgBlip xmlns:asvg="http://schemas.microsoft.com/office/drawing/2016/SVG/main" r:embed="rId8"/>
+              </a:ext>
+            </a:extLst>
+          </a:blip>
+          <a:stretch>
+            <a:fillRect/>
+          </a:stretch>
+        </p:blipFill>
+        <p:spPr>
+          <a:xfrm>
+            <a:off x="609600" y="7252737"/>
+            <a:ext cx="1676400" cy="1676400"/>
+          </a:xfrm>
+          <a:prstGeom prst="rect">
+            <a:avLst/>
+          </a:prstGeom>
+        </p:spPr>
+      </p:pic>
+      <p:sp>
+        <p:nvSpPr>
+          <p:cNvPr id="22" name="ZoneTexte 21">
+            <a:extLst>
+              <a:ext uri="{FF2B5EF4-FFF2-40B4-BE49-F238E27FC236}">
+                <a16:creationId xmlns:a16="http://schemas.microsoft.com/office/drawing/2014/main" id="{5D3F21EF-CE07-8BB6-C80D-4606913630BE}"/>
+              </a:ext>
+            </a:extLst>
+          </p:cNvPr>
+          <p:cNvSpPr txBox="1"/>
+          <p:nvPr/>
+        </p:nvSpPr>
+        <p:spPr>
+          <a:xfrm>
+            <a:off x="2514599" y="7252737"/>
+            <a:ext cx="5943600" cy="1569660"/>
+          </a:xfrm>
+          <a:prstGeom prst="rect">
+            <a:avLst/>
+          </a:prstGeom>
+          <a:noFill/>
+        </p:spPr>
+        <p:txBody>
+          <a:bodyPr wrap="square">
+            <a:spAutoFit/>
+          </a:bodyPr>
+          <a:lstStyle/>
+          <a:p>
+            <a:r>
+              <a:rPr lang="fr-FR" sz="3200" b="1" u="sng" dirty="0">
+                <a:latin typeface="Alegreya" panose="020B0604020202020204" charset="0"/>
+              </a:rPr>
+              <a:t>Livreurs</a:t>
+            </a:r>
+          </a:p>
+          <a:p>
+            <a:pPr marL="285750" indent="-285750">
+              <a:buFont typeface="Symbol" panose="05050102010706020507" pitchFamily="18" charset="2"/>
+              <a:buChar char="®"/>
+            </a:pPr>
+            <a:r>
+              <a:rPr lang="fr-FR" sz="3200" dirty="0">
+                <a:latin typeface="Alegreya" panose="020B0604020202020204" charset="0"/>
+              </a:rPr>
+              <a:t> Accepter/refuser des livraisons, validation via QR Code </a:t>
+            </a:r>
+          </a:p>
+        </p:txBody>
+      </p:sp>
+      <p:pic>
+        <p:nvPicPr>
+          <p:cNvPr id="24" name="Graphique 23" descr="Programmeur contour">
+            <a:extLst>
+              <a:ext uri="{FF2B5EF4-FFF2-40B4-BE49-F238E27FC236}">
+                <a16:creationId xmlns:a16="http://schemas.microsoft.com/office/drawing/2014/main" id="{D08890A8-4DAD-D1B2-39D3-BB424714C1AC}"/>
+              </a:ext>
+            </a:extLst>
+          </p:cNvPr>
+          <p:cNvPicPr>
+            <a:picLocks noChangeAspect="1"/>
+          </p:cNvPicPr>
+          <p:nvPr/>
+        </p:nvPicPr>
+        <p:blipFill>
+          <a:blip r:embed="rId9">
+            <a:extLst>
+              <a:ext uri="{96DAC541-7B7A-43D3-8B79-37D633B846F1}">
+                <asvg:svgBlip xmlns:asvg="http://schemas.microsoft.com/office/drawing/2016/SVG/main" r:embed="rId10"/>
+              </a:ext>
+            </a:extLst>
+          </a:blip>
+          <a:stretch>
+            <a:fillRect/>
+          </a:stretch>
+        </p:blipFill>
+        <p:spPr>
+          <a:xfrm>
+            <a:off x="9067802" y="3027481"/>
+            <a:ext cx="1524000" cy="1524000"/>
+          </a:xfrm>
+          <a:prstGeom prst="rect">
+            <a:avLst/>
+          </a:prstGeom>
+        </p:spPr>
+      </p:pic>
+      <p:sp>
+        <p:nvSpPr>
+          <p:cNvPr id="26" name="ZoneTexte 25">
+            <a:extLst>
+              <a:ext uri="{FF2B5EF4-FFF2-40B4-BE49-F238E27FC236}">
+                <a16:creationId xmlns:a16="http://schemas.microsoft.com/office/drawing/2014/main" id="{3581B02E-24DD-B989-C585-0C41B92E5938}"/>
+              </a:ext>
+            </a:extLst>
+          </p:cNvPr>
+          <p:cNvSpPr txBox="1"/>
+          <p:nvPr/>
+        </p:nvSpPr>
+        <p:spPr>
+          <a:xfrm>
+            <a:off x="10576562" y="3010690"/>
+            <a:ext cx="7086598" cy="1631216"/>
+          </a:xfrm>
+          <a:prstGeom prst="rect">
+            <a:avLst/>
+          </a:prstGeom>
+          <a:noFill/>
+        </p:spPr>
+        <p:txBody>
+          <a:bodyPr wrap="square">
+            <a:spAutoFit/>
+          </a:bodyPr>
+          <a:lstStyle/>
+          <a:p>
+            <a:r>
+              <a:rPr lang="fr-FR" sz="3200" b="1" u="sng" dirty="0">
+                <a:latin typeface="Alegreya" panose="020B0604020202020204" charset="0"/>
+              </a:rPr>
+              <a:t>Développeurs tiers</a:t>
+            </a:r>
+          </a:p>
+          <a:p>
+            <a:pPr marL="457200" indent="-457200">
+              <a:buFont typeface="Symbol" panose="05050102010706020507" pitchFamily="18" charset="2"/>
+              <a:buChar char=""/>
+            </a:pPr>
+            <a:r>
+              <a:rPr lang="fr-FR" sz="3200" dirty="0">
+                <a:latin typeface="Alegreya" panose="020B0604020202020204" charset="0"/>
+              </a:rPr>
+              <a:t> Accéder à l’API, télécharger des composants</a:t>
+            </a:r>
+            <a:endParaRPr lang="fr-FR" sz="3200" dirty="0"/>
+          </a:p>
+        </p:txBody>
+      </p:sp>
+      <p:pic>
+        <p:nvPicPr>
+          <p:cNvPr id="28" name="Graphique 27" descr="Graphique à barres contour">
+            <a:extLst>
+              <a:ext uri="{FF2B5EF4-FFF2-40B4-BE49-F238E27FC236}">
+                <a16:creationId xmlns:a16="http://schemas.microsoft.com/office/drawing/2014/main" id="{0F54A25A-5CCF-5D10-41E6-C4E6FD37C0DA}"/>
+              </a:ext>
+            </a:extLst>
+          </p:cNvPr>
+          <p:cNvPicPr>
+            <a:picLocks noChangeAspect="1"/>
+          </p:cNvPicPr>
+          <p:nvPr/>
+        </p:nvPicPr>
+        <p:blipFill>
+          <a:blip r:embed="rId11">
+            <a:extLst>
+              <a:ext uri="{96DAC541-7B7A-43D3-8B79-37D633B846F1}">
+                <asvg:svgBlip xmlns:asvg="http://schemas.microsoft.com/office/drawing/2016/SVG/main" r:embed="rId12"/>
+              </a:ext>
+            </a:extLst>
+          </a:blip>
+          <a:stretch>
+            <a:fillRect/>
+          </a:stretch>
+        </p:blipFill>
+        <p:spPr>
+          <a:xfrm>
+            <a:off x="8778305" y="5117356"/>
+            <a:ext cx="1813497" cy="1813497"/>
+          </a:xfrm>
+          <a:prstGeom prst="rect">
+            <a:avLst/>
+          </a:prstGeom>
+        </p:spPr>
+      </p:pic>
+      <p:sp>
+        <p:nvSpPr>
+          <p:cNvPr id="30" name="ZoneTexte 29">
+            <a:extLst>
+              <a:ext uri="{FF2B5EF4-FFF2-40B4-BE49-F238E27FC236}">
+                <a16:creationId xmlns:a16="http://schemas.microsoft.com/office/drawing/2014/main" id="{6095782C-CE7C-9969-1ED4-9FFC202EB5BE}"/>
+              </a:ext>
+            </a:extLst>
+          </p:cNvPr>
+          <p:cNvSpPr txBox="1"/>
+          <p:nvPr/>
+        </p:nvSpPr>
+        <p:spPr>
+          <a:xfrm>
+            <a:off x="10744200" y="5202618"/>
+            <a:ext cx="7239000" cy="1631216"/>
+          </a:xfrm>
+          <a:prstGeom prst="rect">
+            <a:avLst/>
+          </a:prstGeom>
+          <a:noFill/>
+        </p:spPr>
+        <p:txBody>
+          <a:bodyPr wrap="square">
+            <a:spAutoFit/>
+          </a:bodyPr>
+          <a:lstStyle/>
+          <a:p>
+            <a:r>
+              <a:rPr lang="fr-FR" sz="3200" b="1" u="sng" dirty="0">
+                <a:latin typeface="Alegreya" panose="020B0604020202020204" charset="0"/>
+              </a:rPr>
+              <a:t>Service commercial</a:t>
+            </a:r>
+          </a:p>
+          <a:p>
+            <a:pPr marL="457200" indent="-457200">
+              <a:buFont typeface="Symbol" panose="05050102010706020507" pitchFamily="18" charset="2"/>
+              <a:buChar char="®"/>
+            </a:pPr>
+            <a:r>
+              <a:rPr lang="fr-FR" sz="3200" dirty="0">
+                <a:latin typeface="Alegreya" panose="020B0604020202020204" charset="0"/>
+              </a:rPr>
+              <a:t> Suivi en temps réel des performances commerciales</a:t>
+            </a:r>
+            <a:endParaRPr lang="fr-FR" sz="3200" dirty="0"/>
+          </a:p>
+        </p:txBody>
+      </p:sp>
+      <p:pic>
+        <p:nvPicPr>
+          <p:cNvPr id="32" name="Graphique 31" descr="Outils contour">
+            <a:extLst>
+              <a:ext uri="{FF2B5EF4-FFF2-40B4-BE49-F238E27FC236}">
+                <a16:creationId xmlns:a16="http://schemas.microsoft.com/office/drawing/2014/main" id="{6451D2E2-995B-6618-2C74-1A1769305BBD}"/>
+              </a:ext>
+            </a:extLst>
+          </p:cNvPr>
+          <p:cNvPicPr>
+            <a:picLocks noChangeAspect="1"/>
+          </p:cNvPicPr>
+          <p:nvPr/>
+        </p:nvPicPr>
+        <p:blipFill>
+          <a:blip r:embed="rId13">
+            <a:extLst>
+              <a:ext uri="{96DAC541-7B7A-43D3-8B79-37D633B846F1}">
+                <asvg:svgBlip xmlns:asvg="http://schemas.microsoft.com/office/drawing/2016/SVG/main" r:embed="rId14"/>
+              </a:ext>
+            </a:extLst>
+          </a:blip>
+          <a:stretch>
+            <a:fillRect/>
+          </a:stretch>
+        </p:blipFill>
+        <p:spPr>
+          <a:xfrm>
+            <a:off x="9067802" y="7394257"/>
+            <a:ext cx="1524000" cy="1524000"/>
+          </a:xfrm>
+          <a:prstGeom prst="rect">
+            <a:avLst/>
+          </a:prstGeom>
+        </p:spPr>
+      </p:pic>
+    </p:spTree>
+    <p:extLst>
+      <p:ext uri="{BB962C8B-B14F-4D97-AF65-F5344CB8AC3E}">
+        <p14:creationId xmlns:p14="http://schemas.microsoft.com/office/powerpoint/2010/main" val="2955636877"/>
+      </p:ext>
+    </p:extLst>
+  </p:cSld>
+  <p:clrMapOvr>
+    <a:masterClrMapping/>
+  </p:clrMapOvr>
+</p:sld>
+</file>
+
+<file path=ppt/slides/slide6.xml><?xml version="1.0" encoding="utf-8"?>
 <p:sld xmlns:a="http://schemas.openxmlformats.org/drawingml/2006/main" xmlns:r="http://schemas.openxmlformats.org/officeDocument/2006/relationships" xmlns:p="http://schemas.openxmlformats.org/presentationml/2006/main">
   <p:cSld>
     <p:spTree>
@@ -10748,6 +12619,109 @@
           </a:p>
         </p:txBody>
       </p:sp>
+      <p:sp>
+        <p:nvSpPr>
+          <p:cNvPr id="13" name="Rectangle 12">
+            <a:extLst>
+              <a:ext uri="{FF2B5EF4-FFF2-40B4-BE49-F238E27FC236}">
+                <a16:creationId xmlns:a16="http://schemas.microsoft.com/office/drawing/2014/main" id="{9F94FEB5-D3E7-74EA-E8F8-86492EED3B22}"/>
+              </a:ext>
+            </a:extLst>
+          </p:cNvPr>
+          <p:cNvSpPr/>
+          <p:nvPr/>
+        </p:nvSpPr>
+        <p:spPr>
+          <a:xfrm>
+            <a:off x="0" y="9410700"/>
+            <a:ext cx="18288000" cy="876300"/>
+          </a:xfrm>
+          <a:prstGeom prst="rect">
+            <a:avLst/>
+          </a:prstGeom>
+          <a:solidFill>
+            <a:srgbClr val="F5F3F3"/>
+          </a:solidFill>
+          <a:ln>
+            <a:solidFill>
+              <a:srgbClr val="F5F3F3"/>
+            </a:solidFill>
+          </a:ln>
+        </p:spPr>
+        <p:style>
+          <a:lnRef idx="2">
+            <a:schemeClr val="accent1">
+              <a:shade val="15000"/>
+            </a:schemeClr>
+          </a:lnRef>
+          <a:fillRef idx="1">
+            <a:schemeClr val="accent1"/>
+          </a:fillRef>
+          <a:effectRef idx="0">
+            <a:schemeClr val="accent1"/>
+          </a:effectRef>
+          <a:fontRef idx="minor">
+            <a:schemeClr val="lt1"/>
+          </a:fontRef>
+        </p:style>
+        <p:txBody>
+          <a:bodyPr rtlCol="0" anchor="ctr"/>
+          <a:lstStyle/>
+          <a:p>
+            <a:pPr algn="ctr"/>
+            <a:endParaRPr lang="fr-FR"/>
+          </a:p>
+        </p:txBody>
+      </p:sp>
+      <p:sp>
+        <p:nvSpPr>
+          <p:cNvPr id="14" name="ZoneTexte 13">
+            <a:extLst>
+              <a:ext uri="{FF2B5EF4-FFF2-40B4-BE49-F238E27FC236}">
+                <a16:creationId xmlns:a16="http://schemas.microsoft.com/office/drawing/2014/main" id="{0E57311F-29C8-A12B-54F7-6C6F1B742A7E}"/>
+              </a:ext>
+            </a:extLst>
+          </p:cNvPr>
+          <p:cNvSpPr txBox="1"/>
+          <p:nvPr/>
+        </p:nvSpPr>
+        <p:spPr>
+          <a:xfrm>
+            <a:off x="609600" y="9587240"/>
+            <a:ext cx="17068800" cy="523220"/>
+          </a:xfrm>
+          <a:prstGeom prst="rect">
+            <a:avLst/>
+          </a:prstGeom>
+          <a:noFill/>
+        </p:spPr>
+        <p:txBody>
+          <a:bodyPr wrap="square" rtlCol="0">
+            <a:spAutoFit/>
+          </a:bodyPr>
+          <a:lstStyle/>
+          <a:p>
+            <a:pPr algn="ctr"/>
+            <a:r>
+              <a:rPr lang="fr-FR" sz="2800" b="1" dirty="0">
+                <a:latin typeface="Alegreya" panose="020B0604020202020204" charset="0"/>
+              </a:rPr>
+              <a:t>Introduction et complexe        </a:t>
+            </a:r>
+            <a:r>
+              <a:rPr lang="fr-FR" sz="2800" dirty="0">
+                <a:solidFill>
+                  <a:schemeClr val="bg1">
+                    <a:lumMod val="50000"/>
+                  </a:schemeClr>
+                </a:solidFill>
+                <a:latin typeface="Alegreya" panose="020B0604020202020204" charset="0"/>
+              </a:rPr>
+              <a:t>–        Développement et démonstration        –        Analyse et conclusion</a:t>
+            </a:r>
+          </a:p>
+        </p:txBody>
+      </p:sp>
     </p:spTree>
     <p:extLst>
       <p:ext uri="{BB962C8B-B14F-4D97-AF65-F5344CB8AC3E}">
@@ -10761,7 +12735,7 @@
 </p:sld>
 </file>
 
-<file path=ppt/slides/slide6.xml><?xml version="1.0" encoding="utf-8"?>
+<file path=ppt/slides/slide7.xml><?xml version="1.0" encoding="utf-8"?>
 <p:sld xmlns:a="http://schemas.openxmlformats.org/drawingml/2006/main" xmlns:r="http://schemas.openxmlformats.org/officeDocument/2006/relationships" xmlns:p="http://schemas.openxmlformats.org/presentationml/2006/main">
   <p:cSld>
     <p:spTree>
@@ -10856,7 +12830,7 @@
 </p:sld>
 </file>
 
-<file path=ppt/slides/slide7.xml><?xml version="1.0" encoding="utf-8"?>
+<file path=ppt/slides/slide8.xml><?xml version="1.0" encoding="utf-8"?>
 <p:sld xmlns:a="http://schemas.openxmlformats.org/drawingml/2006/main" xmlns:r="http://schemas.openxmlformats.org/officeDocument/2006/relationships" xmlns:p="http://schemas.openxmlformats.org/presentationml/2006/main">
   <p:cSld>
     <p:spTree>
@@ -11016,7 +12990,7 @@
 </p:sld>
 </file>
 
-<file path=ppt/slides/slide8.xml><?xml version="1.0" encoding="utf-8"?>
+<file path=ppt/slides/slide9.xml><?xml version="1.0" encoding="utf-8"?>
 <p:sld xmlns:a="http://schemas.openxmlformats.org/drawingml/2006/main" xmlns:r="http://schemas.openxmlformats.org/officeDocument/2006/relationships" xmlns:p="http://schemas.openxmlformats.org/presentationml/2006/main">
   <p:cSld>
     <p:spTree>
@@ -11303,527 +13277,6 @@
               </a:rPr>
               <a:t>Project Overview</a:t>
             </a:r>
-          </a:p>
-        </p:txBody>
-      </p:sp>
-    </p:spTree>
-  </p:cSld>
-  <p:clrMapOvr>
-    <a:masterClrMapping/>
-  </p:clrMapOvr>
-</p:sld>
-</file>
-
-<file path=ppt/slides/slide9.xml><?xml version="1.0" encoding="utf-8"?>
-<p:sld xmlns:a="http://schemas.openxmlformats.org/drawingml/2006/main" xmlns:r="http://schemas.openxmlformats.org/officeDocument/2006/relationships" xmlns:p="http://schemas.openxmlformats.org/presentationml/2006/main">
-  <p:cSld>
-    <p:spTree>
-      <p:nvGrpSpPr>
-        <p:cNvPr id="1" name=""/>
-        <p:cNvGrpSpPr/>
-        <p:nvPr/>
-      </p:nvGrpSpPr>
-      <p:grpSpPr>
-        <a:xfrm>
-          <a:off x="0" y="0"/>
-          <a:ext cx="0" cy="0"/>
-          <a:chOff x="0" y="0"/>
-          <a:chExt cx="0" cy="0"/>
-        </a:xfrm>
-      </p:grpSpPr>
-      <p:sp>
-        <p:nvSpPr>
-          <p:cNvPr id="2" name="Freeform 2"/>
-          <p:cNvSpPr/>
-          <p:nvPr/>
-        </p:nvSpPr>
-        <p:spPr>
-          <a:xfrm>
-            <a:off x="0" y="0"/>
-            <a:ext cx="18288000" cy="10287000"/>
-          </a:xfrm>
-          <a:custGeom>
-            <a:avLst/>
-            <a:gdLst/>
-            <a:ahLst/>
-            <a:cxnLst/>
-            <a:rect l="l" t="t" r="r" b="b"/>
-            <a:pathLst>
-              <a:path w="18288000" h="10287000">
-                <a:moveTo>
-                  <a:pt x="0" y="0"/>
-                </a:moveTo>
-                <a:lnTo>
-                  <a:pt x="18288000" y="0"/>
-                </a:lnTo>
-                <a:lnTo>
-                  <a:pt x="18288000" y="10287000"/>
-                </a:lnTo>
-                <a:lnTo>
-                  <a:pt x="0" y="10287000"/>
-                </a:lnTo>
-                <a:lnTo>
-                  <a:pt x="0" y="0"/>
-                </a:lnTo>
-                <a:close/>
-              </a:path>
-            </a:pathLst>
-          </a:custGeom>
-          <a:blipFill>
-            <a:blip r:embed="rId2"/>
-            <a:stretch>
-              <a:fillRect l="-220" t="-9510" r="-1696" b="-11203"/>
-            </a:stretch>
-          </a:blipFill>
-        </p:spPr>
-        <p:txBody>
-          <a:bodyPr/>
-          <a:lstStyle/>
-          <a:p>
-            <a:endParaRPr lang="fr-FR"/>
-          </a:p>
-        </p:txBody>
-      </p:sp>
-      <p:grpSp>
-        <p:nvGrpSpPr>
-          <p:cNvPr id="3" name="Group 3"/>
-          <p:cNvGrpSpPr>
-            <a:grpSpLocks noChangeAspect="1"/>
-          </p:cNvGrpSpPr>
-          <p:nvPr/>
-        </p:nvGrpSpPr>
-        <p:grpSpPr>
-          <a:xfrm>
-            <a:off x="1334007" y="3124680"/>
-            <a:ext cx="4690072" cy="4690054"/>
-            <a:chOff x="0" y="0"/>
-            <a:chExt cx="6350000" cy="6349975"/>
-          </a:xfrm>
-        </p:grpSpPr>
-        <p:sp>
-          <p:nvSpPr>
-            <p:cNvPr id="4" name="Freeform 4"/>
-            <p:cNvSpPr/>
-            <p:nvPr/>
-          </p:nvSpPr>
-          <p:spPr>
-            <a:xfrm>
-              <a:off x="0" y="0"/>
-              <a:ext cx="6350000" cy="6349974"/>
-            </a:xfrm>
-            <a:custGeom>
-              <a:avLst/>
-              <a:gdLst/>
-              <a:ahLst/>
-              <a:cxnLst/>
-              <a:rect l="l" t="t" r="r" b="b"/>
-              <a:pathLst>
-                <a:path w="6350000" h="6349974">
-                  <a:moveTo>
-                    <a:pt x="6350000" y="3175025"/>
-                  </a:moveTo>
-                  <a:cubicBezTo>
-                    <a:pt x="6350000" y="4928451"/>
-                    <a:pt x="4928476" y="6349974"/>
-                    <a:pt x="3175000" y="6349974"/>
-                  </a:cubicBezTo>
-                  <a:cubicBezTo>
-                    <a:pt x="1421498" y="6349974"/>
-                    <a:pt x="0" y="4928451"/>
-                    <a:pt x="0" y="3175025"/>
-                  </a:cubicBezTo>
-                  <a:cubicBezTo>
-                    <a:pt x="0" y="1421511"/>
-                    <a:pt x="1421498" y="0"/>
-                    <a:pt x="3175000" y="0"/>
-                  </a:cubicBezTo>
-                  <a:cubicBezTo>
-                    <a:pt x="4928501" y="0"/>
-                    <a:pt x="6350000" y="1421511"/>
-                    <a:pt x="6350000" y="3175025"/>
-                  </a:cubicBezTo>
-                  <a:close/>
-                </a:path>
-              </a:pathLst>
-            </a:custGeom>
-            <a:blipFill>
-              <a:blip r:embed="rId3"/>
-              <a:stretch>
-                <a:fillRect l="-13054" t="-34515" r="-639" b="-35813"/>
-              </a:stretch>
-            </a:blipFill>
-          </p:spPr>
-          <p:txBody>
-            <a:bodyPr/>
-            <a:lstStyle/>
-            <a:p>
-              <a:endParaRPr lang="fr-FR"/>
-            </a:p>
-          </p:txBody>
-        </p:sp>
-      </p:grpSp>
-      <p:grpSp>
-        <p:nvGrpSpPr>
-          <p:cNvPr id="5" name="Group 5"/>
-          <p:cNvGrpSpPr>
-            <a:grpSpLocks noChangeAspect="1"/>
-          </p:cNvGrpSpPr>
-          <p:nvPr/>
-        </p:nvGrpSpPr>
-        <p:grpSpPr>
-          <a:xfrm>
-            <a:off x="6818416" y="3124680"/>
-            <a:ext cx="4690072" cy="4690054"/>
-            <a:chOff x="0" y="0"/>
-            <a:chExt cx="6350000" cy="6349975"/>
-          </a:xfrm>
-        </p:grpSpPr>
-        <p:sp>
-          <p:nvSpPr>
-            <p:cNvPr id="6" name="Freeform 6"/>
-            <p:cNvSpPr/>
-            <p:nvPr/>
-          </p:nvSpPr>
-          <p:spPr>
-            <a:xfrm>
-              <a:off x="0" y="0"/>
-              <a:ext cx="6350000" cy="6349974"/>
-            </a:xfrm>
-            <a:custGeom>
-              <a:avLst/>
-              <a:gdLst/>
-              <a:ahLst/>
-              <a:cxnLst/>
-              <a:rect l="l" t="t" r="r" b="b"/>
-              <a:pathLst>
-                <a:path w="6350000" h="6349974">
-                  <a:moveTo>
-                    <a:pt x="6350000" y="3175025"/>
-                  </a:moveTo>
-                  <a:cubicBezTo>
-                    <a:pt x="6350000" y="4928451"/>
-                    <a:pt x="4928476" y="6349974"/>
-                    <a:pt x="3175000" y="6349974"/>
-                  </a:cubicBezTo>
-                  <a:cubicBezTo>
-                    <a:pt x="1421498" y="6349974"/>
-                    <a:pt x="0" y="4928451"/>
-                    <a:pt x="0" y="3175025"/>
-                  </a:cubicBezTo>
-                  <a:cubicBezTo>
-                    <a:pt x="0" y="1421511"/>
-                    <a:pt x="1421498" y="0"/>
-                    <a:pt x="3175000" y="0"/>
-                  </a:cubicBezTo>
-                  <a:cubicBezTo>
-                    <a:pt x="4928501" y="0"/>
-                    <a:pt x="6350000" y="1421511"/>
-                    <a:pt x="6350000" y="3175025"/>
-                  </a:cubicBezTo>
-                  <a:close/>
-                </a:path>
-              </a:pathLst>
-            </a:custGeom>
-            <a:blipFill>
-              <a:blip r:embed="rId4"/>
-              <a:stretch>
-                <a:fillRect t="-44768" b="-5326"/>
-              </a:stretch>
-            </a:blipFill>
-          </p:spPr>
-          <p:txBody>
-            <a:bodyPr/>
-            <a:lstStyle/>
-            <a:p>
-              <a:endParaRPr lang="fr-FR"/>
-            </a:p>
-          </p:txBody>
-        </p:sp>
-      </p:grpSp>
-      <p:grpSp>
-        <p:nvGrpSpPr>
-          <p:cNvPr id="7" name="Group 7"/>
-          <p:cNvGrpSpPr>
-            <a:grpSpLocks noChangeAspect="1"/>
-          </p:cNvGrpSpPr>
-          <p:nvPr/>
-        </p:nvGrpSpPr>
-        <p:grpSpPr>
-          <a:xfrm>
-            <a:off x="12302825" y="3124680"/>
-            <a:ext cx="4690072" cy="4690054"/>
-            <a:chOff x="0" y="0"/>
-            <a:chExt cx="6350000" cy="6349975"/>
-          </a:xfrm>
-        </p:grpSpPr>
-        <p:sp>
-          <p:nvSpPr>
-            <p:cNvPr id="8" name="Freeform 8"/>
-            <p:cNvSpPr/>
-            <p:nvPr/>
-          </p:nvSpPr>
-          <p:spPr>
-            <a:xfrm>
-              <a:off x="0" y="0"/>
-              <a:ext cx="6350000" cy="6349974"/>
-            </a:xfrm>
-            <a:custGeom>
-              <a:avLst/>
-              <a:gdLst/>
-              <a:ahLst/>
-              <a:cxnLst/>
-              <a:rect l="l" t="t" r="r" b="b"/>
-              <a:pathLst>
-                <a:path w="6350000" h="6349974">
-                  <a:moveTo>
-                    <a:pt x="6350000" y="3175025"/>
-                  </a:moveTo>
-                  <a:cubicBezTo>
-                    <a:pt x="6350000" y="4928451"/>
-                    <a:pt x="4928476" y="6349974"/>
-                    <a:pt x="3175000" y="6349974"/>
-                  </a:cubicBezTo>
-                  <a:cubicBezTo>
-                    <a:pt x="1421498" y="6349974"/>
-                    <a:pt x="0" y="4928451"/>
-                    <a:pt x="0" y="3175025"/>
-                  </a:cubicBezTo>
-                  <a:cubicBezTo>
-                    <a:pt x="0" y="1421511"/>
-                    <a:pt x="1421498" y="0"/>
-                    <a:pt x="3175000" y="0"/>
-                  </a:cubicBezTo>
-                  <a:cubicBezTo>
-                    <a:pt x="4928501" y="0"/>
-                    <a:pt x="6350000" y="1421511"/>
-                    <a:pt x="6350000" y="3175025"/>
-                  </a:cubicBezTo>
-                  <a:close/>
-                </a:path>
-              </a:pathLst>
-            </a:custGeom>
-            <a:blipFill>
-              <a:blip r:embed="rId5"/>
-              <a:stretch>
-                <a:fillRect l="-25471" r="-25471"/>
-              </a:stretch>
-            </a:blipFill>
-          </p:spPr>
-          <p:txBody>
-            <a:bodyPr/>
-            <a:lstStyle/>
-            <a:p>
-              <a:endParaRPr lang="fr-FR"/>
-            </a:p>
-          </p:txBody>
-        </p:sp>
-      </p:grpSp>
-      <p:sp>
-        <p:nvSpPr>
-          <p:cNvPr id="9" name="TextBox 9"/>
-          <p:cNvSpPr txBox="1"/>
-          <p:nvPr/>
-        </p:nvSpPr>
-        <p:spPr>
-          <a:xfrm>
-            <a:off x="1372912" y="8033809"/>
-            <a:ext cx="4651168" cy="712470"/>
-          </a:xfrm>
-          <a:prstGeom prst="rect">
-            <a:avLst/>
-          </a:prstGeom>
-        </p:spPr>
-        <p:txBody>
-          <a:bodyPr lIns="0" tIns="0" rIns="0" bIns="0" rtlCol="0" anchor="t">
-            <a:spAutoFit/>
-          </a:bodyPr>
-          <a:lstStyle/>
-          <a:p>
-            <a:pPr algn="ctr">
-              <a:lnSpc>
-                <a:spcPts val="5880"/>
-              </a:lnSpc>
-            </a:pPr>
-            <a:r>
-              <a:rPr lang="en-US" sz="4200" b="1">
-                <a:solidFill>
-                  <a:srgbClr val="000000"/>
-                </a:solidFill>
-                <a:latin typeface="Alegreya Bold"/>
-                <a:ea typeface="Alegreya Bold"/>
-                <a:cs typeface="Alegreya Bold"/>
-                <a:sym typeface="Alegreya Bold"/>
-              </a:rPr>
-              <a:t>Juliana Silva</a:t>
-            </a:r>
-          </a:p>
-        </p:txBody>
-      </p:sp>
-      <p:sp>
-        <p:nvSpPr>
-          <p:cNvPr id="10" name="TextBox 10"/>
-          <p:cNvSpPr txBox="1"/>
-          <p:nvPr/>
-        </p:nvSpPr>
-        <p:spPr>
-          <a:xfrm>
-            <a:off x="6857321" y="8033809"/>
-            <a:ext cx="4651168" cy="712470"/>
-          </a:xfrm>
-          <a:prstGeom prst="rect">
-            <a:avLst/>
-          </a:prstGeom>
-        </p:spPr>
-        <p:txBody>
-          <a:bodyPr lIns="0" tIns="0" rIns="0" bIns="0" rtlCol="0" anchor="t">
-            <a:spAutoFit/>
-          </a:bodyPr>
-          <a:lstStyle/>
-          <a:p>
-            <a:pPr algn="ctr">
-              <a:lnSpc>
-                <a:spcPts val="5880"/>
-              </a:lnSpc>
-            </a:pPr>
-            <a:r>
-              <a:rPr lang="en-US" sz="4200" b="1">
-                <a:solidFill>
-                  <a:srgbClr val="000000"/>
-                </a:solidFill>
-                <a:latin typeface="Alegreya Bold"/>
-                <a:ea typeface="Alegreya Bold"/>
-                <a:cs typeface="Alegreya Bold"/>
-                <a:sym typeface="Alegreya Bold"/>
-              </a:rPr>
-              <a:t>Olivia Wilson</a:t>
-            </a:r>
-          </a:p>
-        </p:txBody>
-      </p:sp>
-      <p:sp>
-        <p:nvSpPr>
-          <p:cNvPr id="11" name="TextBox 11"/>
-          <p:cNvSpPr txBox="1"/>
-          <p:nvPr/>
-        </p:nvSpPr>
-        <p:spPr>
-          <a:xfrm>
-            <a:off x="12341730" y="8033809"/>
-            <a:ext cx="4651168" cy="712470"/>
-          </a:xfrm>
-          <a:prstGeom prst="rect">
-            <a:avLst/>
-          </a:prstGeom>
-        </p:spPr>
-        <p:txBody>
-          <a:bodyPr lIns="0" tIns="0" rIns="0" bIns="0" rtlCol="0" anchor="t">
-            <a:spAutoFit/>
-          </a:bodyPr>
-          <a:lstStyle/>
-          <a:p>
-            <a:pPr algn="ctr">
-              <a:lnSpc>
-                <a:spcPts val="5880"/>
-              </a:lnSpc>
-            </a:pPr>
-            <a:r>
-              <a:rPr lang="en-US" sz="4200" b="1">
-                <a:solidFill>
-                  <a:srgbClr val="000000"/>
-                </a:solidFill>
-                <a:latin typeface="Alegreya Bold"/>
-                <a:ea typeface="Alegreya Bold"/>
-                <a:cs typeface="Alegreya Bold"/>
-                <a:sym typeface="Alegreya Bold"/>
-              </a:rPr>
-              <a:t>Claudia Alves</a:t>
-            </a:r>
-          </a:p>
-        </p:txBody>
-      </p:sp>
-      <p:sp>
-        <p:nvSpPr>
-          <p:cNvPr id="12" name="TextBox 12"/>
-          <p:cNvSpPr txBox="1"/>
-          <p:nvPr/>
-        </p:nvSpPr>
-        <p:spPr>
-          <a:xfrm>
-            <a:off x="3679044" y="847725"/>
-            <a:ext cx="10929913" cy="1332031"/>
-          </a:xfrm>
-          <a:prstGeom prst="rect">
-            <a:avLst/>
-          </a:prstGeom>
-        </p:spPr>
-        <p:txBody>
-          <a:bodyPr lIns="0" tIns="0" rIns="0" bIns="0" rtlCol="0" anchor="t">
-            <a:spAutoFit/>
-          </a:bodyPr>
-          <a:lstStyle/>
-          <a:p>
-            <a:pPr algn="ctr">
-              <a:lnSpc>
-                <a:spcPts val="11432"/>
-              </a:lnSpc>
-            </a:pPr>
-            <a:r>
-              <a:rPr lang="en-US" sz="8165" dirty="0">
-                <a:solidFill>
-                  <a:srgbClr val="000000"/>
-                </a:solidFill>
-                <a:latin typeface="Bobby Jones"/>
-                <a:ea typeface="Bobby Jones"/>
-                <a:cs typeface="Bobby Jones"/>
-                <a:sym typeface="Bobby Jones"/>
-              </a:rPr>
-              <a:t>﻿</a:t>
-            </a:r>
-            <a:r>
-              <a:rPr lang="en-US" sz="8165" dirty="0" err="1">
-                <a:solidFill>
-                  <a:srgbClr val="000000"/>
-                </a:solidFill>
-                <a:latin typeface="Bobby Jones"/>
-                <a:ea typeface="Bobby Jones"/>
-                <a:cs typeface="Bobby Jones"/>
-                <a:sym typeface="Bobby Jones"/>
-              </a:rPr>
-              <a:t>Présentation</a:t>
-            </a:r>
-            <a:r>
-              <a:rPr lang="en-US" sz="8165" dirty="0">
-                <a:solidFill>
-                  <a:srgbClr val="000000"/>
-                </a:solidFill>
-                <a:latin typeface="Bobby Jones"/>
-                <a:ea typeface="Bobby Jones"/>
-                <a:cs typeface="Bobby Jones"/>
-                <a:sym typeface="Bobby Jones"/>
-              </a:rPr>
-              <a:t> du </a:t>
-            </a:r>
-            <a:r>
-              <a:rPr lang="en-US" sz="8165" dirty="0" err="1">
-                <a:solidFill>
-                  <a:srgbClr val="000000"/>
-                </a:solidFill>
-                <a:latin typeface="Bobby Jones"/>
-                <a:ea typeface="Bobby Jones"/>
-                <a:cs typeface="Bobby Jones"/>
-                <a:sym typeface="Bobby Jones"/>
-              </a:rPr>
-              <a:t>groupe</a:t>
-            </a:r>
-            <a:endParaRPr lang="en-US" sz="8165" dirty="0">
-              <a:solidFill>
-                <a:srgbClr val="000000"/>
-              </a:solidFill>
-              <a:latin typeface="Bobby Jones"/>
-              <a:ea typeface="Bobby Jones"/>
-              <a:cs typeface="Bobby Jones"/>
-              <a:sym typeface="Bobby Jones"/>
-            </a:endParaRPr>
           </a:p>
         </p:txBody>
       </p:sp>

</xml_diff>